<commit_message>
Sporo napisane macierzowo :)
</commit_message>
<xml_diff>
--- a/rysowanie/skrz1_1.pptx
+++ b/rysowanie/skrz1_1.pptx
@@ -6,6 +6,7 @@
   </p:sldMasterIdLst>
   <p:sldIdLst>
     <p:sldId id="256" r:id="rId2"/>
+    <p:sldId id="257" r:id="rId3"/>
   </p:sldIdLst>
   <p:sldSz cx="12192000" cy="6858000"/>
   <p:notesSz cx="6858000" cy="9144000"/>
@@ -129,7 +130,7 @@
           <p:cNvPr id="2" name="Tytuł 1">
             <a:extLst>
               <a:ext uri="{FF2B5EF4-FFF2-40B4-BE49-F238E27FC236}">
-                <a16:creationId xmlns:a16="http://schemas.microsoft.com/office/drawing/2014/main" id="{BAFE5545-A2CB-43B7-A24F-96240B7A8875}"/>
+                <a16:creationId xmlns:a16="http://schemas.microsoft.com/office/drawing/2014/main" xmlns="" id="{BAFE5545-A2CB-43B7-A24F-96240B7A8875}"/>
               </a:ext>
             </a:extLst>
           </p:cNvPr>
@@ -166,7 +167,7 @@
           <p:cNvPr id="3" name="Podtytuł 2">
             <a:extLst>
               <a:ext uri="{FF2B5EF4-FFF2-40B4-BE49-F238E27FC236}">
-                <a16:creationId xmlns:a16="http://schemas.microsoft.com/office/drawing/2014/main" id="{972C7440-CC0C-486B-9032-A1CD6315A602}"/>
+                <a16:creationId xmlns:a16="http://schemas.microsoft.com/office/drawing/2014/main" xmlns="" id="{972C7440-CC0C-486B-9032-A1CD6315A602}"/>
               </a:ext>
             </a:extLst>
           </p:cNvPr>
@@ -236,7 +237,7 @@
           <p:cNvPr id="4" name="Symbol zastępczy daty 3">
             <a:extLst>
               <a:ext uri="{FF2B5EF4-FFF2-40B4-BE49-F238E27FC236}">
-                <a16:creationId xmlns:a16="http://schemas.microsoft.com/office/drawing/2014/main" id="{BB9C4218-931C-4D40-BFEE-FFF402626F27}"/>
+                <a16:creationId xmlns:a16="http://schemas.microsoft.com/office/drawing/2014/main" xmlns="" id="{BB9C4218-931C-4D40-BFEE-FFF402626F27}"/>
               </a:ext>
             </a:extLst>
           </p:cNvPr>
@@ -254,7 +255,7 @@
           <a:p>
             <a:fld id="{3637D940-39A0-467B-8185-43E8B1E8136A}" type="datetimeFigureOut">
               <a:rPr lang="pl-PL" smtClean="0"/>
-              <a:t>2019-02-22</a:t>
+              <a:t>2019-03-02</a:t>
             </a:fld>
             <a:endParaRPr lang="pl-PL"/>
           </a:p>
@@ -265,7 +266,7 @@
           <p:cNvPr id="5" name="Symbol zastępczy stopki 4">
             <a:extLst>
               <a:ext uri="{FF2B5EF4-FFF2-40B4-BE49-F238E27FC236}">
-                <a16:creationId xmlns:a16="http://schemas.microsoft.com/office/drawing/2014/main" id="{D86C43E9-1649-493E-ABB6-F1EFE2B530D3}"/>
+                <a16:creationId xmlns:a16="http://schemas.microsoft.com/office/drawing/2014/main" xmlns="" id="{D86C43E9-1649-493E-ABB6-F1EFE2B530D3}"/>
               </a:ext>
             </a:extLst>
           </p:cNvPr>
@@ -290,7 +291,7 @@
           <p:cNvPr id="6" name="Symbol zastępczy numeru slajdu 5">
             <a:extLst>
               <a:ext uri="{FF2B5EF4-FFF2-40B4-BE49-F238E27FC236}">
-                <a16:creationId xmlns:a16="http://schemas.microsoft.com/office/drawing/2014/main" id="{9DE7B5C7-00A1-4988-8AB6-522E998A68AC}"/>
+                <a16:creationId xmlns:a16="http://schemas.microsoft.com/office/drawing/2014/main" xmlns="" id="{9DE7B5C7-00A1-4988-8AB6-522E998A68AC}"/>
               </a:ext>
             </a:extLst>
           </p:cNvPr>
@@ -349,7 +350,7 @@
           <p:cNvPr id="2" name="Tytuł 1">
             <a:extLst>
               <a:ext uri="{FF2B5EF4-FFF2-40B4-BE49-F238E27FC236}">
-                <a16:creationId xmlns:a16="http://schemas.microsoft.com/office/drawing/2014/main" id="{0BBA6CFF-7673-4C6C-A70C-0F7DC742A542}"/>
+                <a16:creationId xmlns:a16="http://schemas.microsoft.com/office/drawing/2014/main" xmlns="" id="{0BBA6CFF-7673-4C6C-A70C-0F7DC742A542}"/>
               </a:ext>
             </a:extLst>
           </p:cNvPr>
@@ -377,7 +378,7 @@
           <p:cNvPr id="3" name="Symbol zastępczy tytułu pionowego 2">
             <a:extLst>
               <a:ext uri="{FF2B5EF4-FFF2-40B4-BE49-F238E27FC236}">
-                <a16:creationId xmlns:a16="http://schemas.microsoft.com/office/drawing/2014/main" id="{68A9B044-1D8C-4571-BE18-F41D1A59EE08}"/>
+                <a16:creationId xmlns:a16="http://schemas.microsoft.com/office/drawing/2014/main" xmlns="" id="{68A9B044-1D8C-4571-BE18-F41D1A59EE08}"/>
               </a:ext>
             </a:extLst>
           </p:cNvPr>
@@ -434,7 +435,7 @@
           <p:cNvPr id="4" name="Symbol zastępczy daty 3">
             <a:extLst>
               <a:ext uri="{FF2B5EF4-FFF2-40B4-BE49-F238E27FC236}">
-                <a16:creationId xmlns:a16="http://schemas.microsoft.com/office/drawing/2014/main" id="{6FD8D6D7-66C3-4357-A489-EBE15D50DA1A}"/>
+                <a16:creationId xmlns:a16="http://schemas.microsoft.com/office/drawing/2014/main" xmlns="" id="{6FD8D6D7-66C3-4357-A489-EBE15D50DA1A}"/>
               </a:ext>
             </a:extLst>
           </p:cNvPr>
@@ -452,7 +453,7 @@
           <a:p>
             <a:fld id="{3637D940-39A0-467B-8185-43E8B1E8136A}" type="datetimeFigureOut">
               <a:rPr lang="pl-PL" smtClean="0"/>
-              <a:t>2019-02-22</a:t>
+              <a:t>2019-03-02</a:t>
             </a:fld>
             <a:endParaRPr lang="pl-PL"/>
           </a:p>
@@ -463,7 +464,7 @@
           <p:cNvPr id="5" name="Symbol zastępczy stopki 4">
             <a:extLst>
               <a:ext uri="{FF2B5EF4-FFF2-40B4-BE49-F238E27FC236}">
-                <a16:creationId xmlns:a16="http://schemas.microsoft.com/office/drawing/2014/main" id="{F95AA039-768C-44B9-8540-53A9C331297C}"/>
+                <a16:creationId xmlns:a16="http://schemas.microsoft.com/office/drawing/2014/main" xmlns="" id="{F95AA039-768C-44B9-8540-53A9C331297C}"/>
               </a:ext>
             </a:extLst>
           </p:cNvPr>
@@ -488,7 +489,7 @@
           <p:cNvPr id="6" name="Symbol zastępczy numeru slajdu 5">
             <a:extLst>
               <a:ext uri="{FF2B5EF4-FFF2-40B4-BE49-F238E27FC236}">
-                <a16:creationId xmlns:a16="http://schemas.microsoft.com/office/drawing/2014/main" id="{B96ECE7A-CB65-43A3-9242-9A5E839C19D7}"/>
+                <a16:creationId xmlns:a16="http://schemas.microsoft.com/office/drawing/2014/main" xmlns="" id="{B96ECE7A-CB65-43A3-9242-9A5E839C19D7}"/>
               </a:ext>
             </a:extLst>
           </p:cNvPr>
@@ -547,7 +548,7 @@
           <p:cNvPr id="2" name="Tytuł pionowy 1">
             <a:extLst>
               <a:ext uri="{FF2B5EF4-FFF2-40B4-BE49-F238E27FC236}">
-                <a16:creationId xmlns:a16="http://schemas.microsoft.com/office/drawing/2014/main" id="{CA60123E-09BE-44EB-AAAF-07D91EC4415F}"/>
+                <a16:creationId xmlns:a16="http://schemas.microsoft.com/office/drawing/2014/main" xmlns="" id="{CA60123E-09BE-44EB-AAAF-07D91EC4415F}"/>
               </a:ext>
             </a:extLst>
           </p:cNvPr>
@@ -580,7 +581,7 @@
           <p:cNvPr id="3" name="Symbol zastępczy tytułu pionowego 2">
             <a:extLst>
               <a:ext uri="{FF2B5EF4-FFF2-40B4-BE49-F238E27FC236}">
-                <a16:creationId xmlns:a16="http://schemas.microsoft.com/office/drawing/2014/main" id="{152EDCED-BB2B-4B20-BE8C-31C6D6BDDF2D}"/>
+                <a16:creationId xmlns:a16="http://schemas.microsoft.com/office/drawing/2014/main" xmlns="" id="{152EDCED-BB2B-4B20-BE8C-31C6D6BDDF2D}"/>
               </a:ext>
             </a:extLst>
           </p:cNvPr>
@@ -642,7 +643,7 @@
           <p:cNvPr id="4" name="Symbol zastępczy daty 3">
             <a:extLst>
               <a:ext uri="{FF2B5EF4-FFF2-40B4-BE49-F238E27FC236}">
-                <a16:creationId xmlns:a16="http://schemas.microsoft.com/office/drawing/2014/main" id="{B50F667C-9BFD-4AD2-89CA-235FA1F3287A}"/>
+                <a16:creationId xmlns:a16="http://schemas.microsoft.com/office/drawing/2014/main" xmlns="" id="{B50F667C-9BFD-4AD2-89CA-235FA1F3287A}"/>
               </a:ext>
             </a:extLst>
           </p:cNvPr>
@@ -660,7 +661,7 @@
           <a:p>
             <a:fld id="{3637D940-39A0-467B-8185-43E8B1E8136A}" type="datetimeFigureOut">
               <a:rPr lang="pl-PL" smtClean="0"/>
-              <a:t>2019-02-22</a:t>
+              <a:t>2019-03-02</a:t>
             </a:fld>
             <a:endParaRPr lang="pl-PL"/>
           </a:p>
@@ -671,7 +672,7 @@
           <p:cNvPr id="5" name="Symbol zastępczy stopki 4">
             <a:extLst>
               <a:ext uri="{FF2B5EF4-FFF2-40B4-BE49-F238E27FC236}">
-                <a16:creationId xmlns:a16="http://schemas.microsoft.com/office/drawing/2014/main" id="{D2D12A91-600D-472A-805F-2643869091F1}"/>
+                <a16:creationId xmlns:a16="http://schemas.microsoft.com/office/drawing/2014/main" xmlns="" id="{D2D12A91-600D-472A-805F-2643869091F1}"/>
               </a:ext>
             </a:extLst>
           </p:cNvPr>
@@ -696,7 +697,7 @@
           <p:cNvPr id="6" name="Symbol zastępczy numeru slajdu 5">
             <a:extLst>
               <a:ext uri="{FF2B5EF4-FFF2-40B4-BE49-F238E27FC236}">
-                <a16:creationId xmlns:a16="http://schemas.microsoft.com/office/drawing/2014/main" id="{DAA14E5E-DF87-4A4B-B711-96D24AD9B49B}"/>
+                <a16:creationId xmlns:a16="http://schemas.microsoft.com/office/drawing/2014/main" xmlns="" id="{DAA14E5E-DF87-4A4B-B711-96D24AD9B49B}"/>
               </a:ext>
             </a:extLst>
           </p:cNvPr>
@@ -755,7 +756,7 @@
           <p:cNvPr id="2" name="Tytuł 1">
             <a:extLst>
               <a:ext uri="{FF2B5EF4-FFF2-40B4-BE49-F238E27FC236}">
-                <a16:creationId xmlns:a16="http://schemas.microsoft.com/office/drawing/2014/main" id="{DEC6612C-2FBF-4398-91CA-D6D28BC5E15F}"/>
+                <a16:creationId xmlns:a16="http://schemas.microsoft.com/office/drawing/2014/main" xmlns="" id="{DEC6612C-2FBF-4398-91CA-D6D28BC5E15F}"/>
               </a:ext>
             </a:extLst>
           </p:cNvPr>
@@ -783,7 +784,7 @@
           <p:cNvPr id="3" name="Symbol zastępczy zawartości 2">
             <a:extLst>
               <a:ext uri="{FF2B5EF4-FFF2-40B4-BE49-F238E27FC236}">
-                <a16:creationId xmlns:a16="http://schemas.microsoft.com/office/drawing/2014/main" id="{074E16D2-ED18-4EC7-B28D-4FD8DCC980FC}"/>
+                <a16:creationId xmlns:a16="http://schemas.microsoft.com/office/drawing/2014/main" xmlns="" id="{074E16D2-ED18-4EC7-B28D-4FD8DCC980FC}"/>
               </a:ext>
             </a:extLst>
           </p:cNvPr>
@@ -840,7 +841,7 @@
           <p:cNvPr id="4" name="Symbol zastępczy daty 3">
             <a:extLst>
               <a:ext uri="{FF2B5EF4-FFF2-40B4-BE49-F238E27FC236}">
-                <a16:creationId xmlns:a16="http://schemas.microsoft.com/office/drawing/2014/main" id="{0BED8935-DE17-4915-957A-9A20ADC95749}"/>
+                <a16:creationId xmlns:a16="http://schemas.microsoft.com/office/drawing/2014/main" xmlns="" id="{0BED8935-DE17-4915-957A-9A20ADC95749}"/>
               </a:ext>
             </a:extLst>
           </p:cNvPr>
@@ -858,7 +859,7 @@
           <a:p>
             <a:fld id="{3637D940-39A0-467B-8185-43E8B1E8136A}" type="datetimeFigureOut">
               <a:rPr lang="pl-PL" smtClean="0"/>
-              <a:t>2019-02-22</a:t>
+              <a:t>2019-03-02</a:t>
             </a:fld>
             <a:endParaRPr lang="pl-PL"/>
           </a:p>
@@ -869,7 +870,7 @@
           <p:cNvPr id="5" name="Symbol zastępczy stopki 4">
             <a:extLst>
               <a:ext uri="{FF2B5EF4-FFF2-40B4-BE49-F238E27FC236}">
-                <a16:creationId xmlns:a16="http://schemas.microsoft.com/office/drawing/2014/main" id="{87B302AC-9DE2-43AF-A2E9-12A5899EC48D}"/>
+                <a16:creationId xmlns:a16="http://schemas.microsoft.com/office/drawing/2014/main" xmlns="" id="{87B302AC-9DE2-43AF-A2E9-12A5899EC48D}"/>
               </a:ext>
             </a:extLst>
           </p:cNvPr>
@@ -894,7 +895,7 @@
           <p:cNvPr id="6" name="Symbol zastępczy numeru slajdu 5">
             <a:extLst>
               <a:ext uri="{FF2B5EF4-FFF2-40B4-BE49-F238E27FC236}">
-                <a16:creationId xmlns:a16="http://schemas.microsoft.com/office/drawing/2014/main" id="{C84A474B-826C-483A-A4A9-BEB2EC8B6966}"/>
+                <a16:creationId xmlns:a16="http://schemas.microsoft.com/office/drawing/2014/main" xmlns="" id="{C84A474B-826C-483A-A4A9-BEB2EC8B6966}"/>
               </a:ext>
             </a:extLst>
           </p:cNvPr>
@@ -953,7 +954,7 @@
           <p:cNvPr id="2" name="Tytuł 1">
             <a:extLst>
               <a:ext uri="{FF2B5EF4-FFF2-40B4-BE49-F238E27FC236}">
-                <a16:creationId xmlns:a16="http://schemas.microsoft.com/office/drawing/2014/main" id="{B2AB57C0-B6A2-4B09-BE38-DCB80EAB2978}"/>
+                <a16:creationId xmlns:a16="http://schemas.microsoft.com/office/drawing/2014/main" xmlns="" id="{B2AB57C0-B6A2-4B09-BE38-DCB80EAB2978}"/>
               </a:ext>
             </a:extLst>
           </p:cNvPr>
@@ -990,7 +991,7 @@
           <p:cNvPr id="3" name="Symbol zastępczy tekstu 2">
             <a:extLst>
               <a:ext uri="{FF2B5EF4-FFF2-40B4-BE49-F238E27FC236}">
-                <a16:creationId xmlns:a16="http://schemas.microsoft.com/office/drawing/2014/main" id="{099B2594-DA0B-49AA-B9B7-1B127761AD89}"/>
+                <a16:creationId xmlns:a16="http://schemas.microsoft.com/office/drawing/2014/main" xmlns="" id="{099B2594-DA0B-49AA-B9B7-1B127761AD89}"/>
               </a:ext>
             </a:extLst>
           </p:cNvPr>
@@ -1115,7 +1116,7 @@
           <p:cNvPr id="4" name="Symbol zastępczy daty 3">
             <a:extLst>
               <a:ext uri="{FF2B5EF4-FFF2-40B4-BE49-F238E27FC236}">
-                <a16:creationId xmlns:a16="http://schemas.microsoft.com/office/drawing/2014/main" id="{522E609A-C3AE-4C02-8034-14F6F2E3DD01}"/>
+                <a16:creationId xmlns:a16="http://schemas.microsoft.com/office/drawing/2014/main" xmlns="" id="{522E609A-C3AE-4C02-8034-14F6F2E3DD01}"/>
               </a:ext>
             </a:extLst>
           </p:cNvPr>
@@ -1133,7 +1134,7 @@
           <a:p>
             <a:fld id="{3637D940-39A0-467B-8185-43E8B1E8136A}" type="datetimeFigureOut">
               <a:rPr lang="pl-PL" smtClean="0"/>
-              <a:t>2019-02-22</a:t>
+              <a:t>2019-03-02</a:t>
             </a:fld>
             <a:endParaRPr lang="pl-PL"/>
           </a:p>
@@ -1144,7 +1145,7 @@
           <p:cNvPr id="5" name="Symbol zastępczy stopki 4">
             <a:extLst>
               <a:ext uri="{FF2B5EF4-FFF2-40B4-BE49-F238E27FC236}">
-                <a16:creationId xmlns:a16="http://schemas.microsoft.com/office/drawing/2014/main" id="{7170B1AD-0C92-480E-99C8-E33A839F0A01}"/>
+                <a16:creationId xmlns:a16="http://schemas.microsoft.com/office/drawing/2014/main" xmlns="" id="{7170B1AD-0C92-480E-99C8-E33A839F0A01}"/>
               </a:ext>
             </a:extLst>
           </p:cNvPr>
@@ -1169,7 +1170,7 @@
           <p:cNvPr id="6" name="Symbol zastępczy numeru slajdu 5">
             <a:extLst>
               <a:ext uri="{FF2B5EF4-FFF2-40B4-BE49-F238E27FC236}">
-                <a16:creationId xmlns:a16="http://schemas.microsoft.com/office/drawing/2014/main" id="{24D24743-D268-4A64-8F5F-EE79BEE94A02}"/>
+                <a16:creationId xmlns:a16="http://schemas.microsoft.com/office/drawing/2014/main" xmlns="" id="{24D24743-D268-4A64-8F5F-EE79BEE94A02}"/>
               </a:ext>
             </a:extLst>
           </p:cNvPr>
@@ -1228,7 +1229,7 @@
           <p:cNvPr id="2" name="Tytuł 1">
             <a:extLst>
               <a:ext uri="{FF2B5EF4-FFF2-40B4-BE49-F238E27FC236}">
-                <a16:creationId xmlns:a16="http://schemas.microsoft.com/office/drawing/2014/main" id="{AC545216-4448-4F88-A5CF-057DC7F3116B}"/>
+                <a16:creationId xmlns:a16="http://schemas.microsoft.com/office/drawing/2014/main" xmlns="" id="{AC545216-4448-4F88-A5CF-057DC7F3116B}"/>
               </a:ext>
             </a:extLst>
           </p:cNvPr>
@@ -1256,7 +1257,7 @@
           <p:cNvPr id="3" name="Symbol zastępczy zawartości 2">
             <a:extLst>
               <a:ext uri="{FF2B5EF4-FFF2-40B4-BE49-F238E27FC236}">
-                <a16:creationId xmlns:a16="http://schemas.microsoft.com/office/drawing/2014/main" id="{1EAEC2BD-ACAE-4B49-BB6D-AC31C57E542C}"/>
+                <a16:creationId xmlns:a16="http://schemas.microsoft.com/office/drawing/2014/main" xmlns="" id="{1EAEC2BD-ACAE-4B49-BB6D-AC31C57E542C}"/>
               </a:ext>
             </a:extLst>
           </p:cNvPr>
@@ -1318,7 +1319,7 @@
           <p:cNvPr id="4" name="Symbol zastępczy zawartości 3">
             <a:extLst>
               <a:ext uri="{FF2B5EF4-FFF2-40B4-BE49-F238E27FC236}">
-                <a16:creationId xmlns:a16="http://schemas.microsoft.com/office/drawing/2014/main" id="{D8A3A070-B043-423E-9979-0F44C44661C2}"/>
+                <a16:creationId xmlns:a16="http://schemas.microsoft.com/office/drawing/2014/main" xmlns="" id="{D8A3A070-B043-423E-9979-0F44C44661C2}"/>
               </a:ext>
             </a:extLst>
           </p:cNvPr>
@@ -1380,7 +1381,7 @@
           <p:cNvPr id="5" name="Symbol zastępczy daty 4">
             <a:extLst>
               <a:ext uri="{FF2B5EF4-FFF2-40B4-BE49-F238E27FC236}">
-                <a16:creationId xmlns:a16="http://schemas.microsoft.com/office/drawing/2014/main" id="{5E6A641E-FD8B-4A98-8FD3-D920FCDBFC4A}"/>
+                <a16:creationId xmlns:a16="http://schemas.microsoft.com/office/drawing/2014/main" xmlns="" id="{5E6A641E-FD8B-4A98-8FD3-D920FCDBFC4A}"/>
               </a:ext>
             </a:extLst>
           </p:cNvPr>
@@ -1398,7 +1399,7 @@
           <a:p>
             <a:fld id="{3637D940-39A0-467B-8185-43E8B1E8136A}" type="datetimeFigureOut">
               <a:rPr lang="pl-PL" smtClean="0"/>
-              <a:t>2019-02-22</a:t>
+              <a:t>2019-03-02</a:t>
             </a:fld>
             <a:endParaRPr lang="pl-PL"/>
           </a:p>
@@ -1409,7 +1410,7 @@
           <p:cNvPr id="6" name="Symbol zastępczy stopki 5">
             <a:extLst>
               <a:ext uri="{FF2B5EF4-FFF2-40B4-BE49-F238E27FC236}">
-                <a16:creationId xmlns:a16="http://schemas.microsoft.com/office/drawing/2014/main" id="{BC825903-E5ED-414A-B27D-A535C2B94F33}"/>
+                <a16:creationId xmlns:a16="http://schemas.microsoft.com/office/drawing/2014/main" xmlns="" id="{BC825903-E5ED-414A-B27D-A535C2B94F33}"/>
               </a:ext>
             </a:extLst>
           </p:cNvPr>
@@ -1434,7 +1435,7 @@
           <p:cNvPr id="7" name="Symbol zastępczy numeru slajdu 6">
             <a:extLst>
               <a:ext uri="{FF2B5EF4-FFF2-40B4-BE49-F238E27FC236}">
-                <a16:creationId xmlns:a16="http://schemas.microsoft.com/office/drawing/2014/main" id="{10CA8BA0-734B-4734-8CBC-699689B5C8E5}"/>
+                <a16:creationId xmlns:a16="http://schemas.microsoft.com/office/drawing/2014/main" xmlns="" id="{10CA8BA0-734B-4734-8CBC-699689B5C8E5}"/>
               </a:ext>
             </a:extLst>
           </p:cNvPr>
@@ -1493,7 +1494,7 @@
           <p:cNvPr id="2" name="Tytuł 1">
             <a:extLst>
               <a:ext uri="{FF2B5EF4-FFF2-40B4-BE49-F238E27FC236}">
-                <a16:creationId xmlns:a16="http://schemas.microsoft.com/office/drawing/2014/main" id="{FC042188-C382-4C0A-A163-399628BA5E93}"/>
+                <a16:creationId xmlns:a16="http://schemas.microsoft.com/office/drawing/2014/main" xmlns="" id="{FC042188-C382-4C0A-A163-399628BA5E93}"/>
               </a:ext>
             </a:extLst>
           </p:cNvPr>
@@ -1526,7 +1527,7 @@
           <p:cNvPr id="3" name="Symbol zastępczy tekstu 2">
             <a:extLst>
               <a:ext uri="{FF2B5EF4-FFF2-40B4-BE49-F238E27FC236}">
-                <a16:creationId xmlns:a16="http://schemas.microsoft.com/office/drawing/2014/main" id="{316679E9-618E-4E64-859A-B779BFD21EE8}"/>
+                <a16:creationId xmlns:a16="http://schemas.microsoft.com/office/drawing/2014/main" xmlns="" id="{316679E9-618E-4E64-859A-B779BFD21EE8}"/>
               </a:ext>
             </a:extLst>
           </p:cNvPr>
@@ -1597,7 +1598,7 @@
           <p:cNvPr id="4" name="Symbol zastępczy zawartości 3">
             <a:extLst>
               <a:ext uri="{FF2B5EF4-FFF2-40B4-BE49-F238E27FC236}">
-                <a16:creationId xmlns:a16="http://schemas.microsoft.com/office/drawing/2014/main" id="{D26329E8-EF0C-4C13-8D44-760C931750D9}"/>
+                <a16:creationId xmlns:a16="http://schemas.microsoft.com/office/drawing/2014/main" xmlns="" id="{D26329E8-EF0C-4C13-8D44-760C931750D9}"/>
               </a:ext>
             </a:extLst>
           </p:cNvPr>
@@ -1659,7 +1660,7 @@
           <p:cNvPr id="5" name="Symbol zastępczy tekstu 4">
             <a:extLst>
               <a:ext uri="{FF2B5EF4-FFF2-40B4-BE49-F238E27FC236}">
-                <a16:creationId xmlns:a16="http://schemas.microsoft.com/office/drawing/2014/main" id="{510BE8B9-057A-415B-B35D-13D04BC1DDED}"/>
+                <a16:creationId xmlns:a16="http://schemas.microsoft.com/office/drawing/2014/main" xmlns="" id="{510BE8B9-057A-415B-B35D-13D04BC1DDED}"/>
               </a:ext>
             </a:extLst>
           </p:cNvPr>
@@ -1730,7 +1731,7 @@
           <p:cNvPr id="6" name="Symbol zastępczy zawartości 5">
             <a:extLst>
               <a:ext uri="{FF2B5EF4-FFF2-40B4-BE49-F238E27FC236}">
-                <a16:creationId xmlns:a16="http://schemas.microsoft.com/office/drawing/2014/main" id="{D4D758CC-73C7-4918-A7DE-EC9AFAD6AEA2}"/>
+                <a16:creationId xmlns:a16="http://schemas.microsoft.com/office/drawing/2014/main" xmlns="" id="{D4D758CC-73C7-4918-A7DE-EC9AFAD6AEA2}"/>
               </a:ext>
             </a:extLst>
           </p:cNvPr>
@@ -1792,7 +1793,7 @@
           <p:cNvPr id="7" name="Symbol zastępczy daty 6">
             <a:extLst>
               <a:ext uri="{FF2B5EF4-FFF2-40B4-BE49-F238E27FC236}">
-                <a16:creationId xmlns:a16="http://schemas.microsoft.com/office/drawing/2014/main" id="{FF0F29E5-886A-41F3-A6F5-CAF2EC2D3233}"/>
+                <a16:creationId xmlns:a16="http://schemas.microsoft.com/office/drawing/2014/main" xmlns="" id="{FF0F29E5-886A-41F3-A6F5-CAF2EC2D3233}"/>
               </a:ext>
             </a:extLst>
           </p:cNvPr>
@@ -1810,7 +1811,7 @@
           <a:p>
             <a:fld id="{3637D940-39A0-467B-8185-43E8B1E8136A}" type="datetimeFigureOut">
               <a:rPr lang="pl-PL" smtClean="0"/>
-              <a:t>2019-02-22</a:t>
+              <a:t>2019-03-02</a:t>
             </a:fld>
             <a:endParaRPr lang="pl-PL"/>
           </a:p>
@@ -1821,7 +1822,7 @@
           <p:cNvPr id="8" name="Symbol zastępczy stopki 7">
             <a:extLst>
               <a:ext uri="{FF2B5EF4-FFF2-40B4-BE49-F238E27FC236}">
-                <a16:creationId xmlns:a16="http://schemas.microsoft.com/office/drawing/2014/main" id="{793C0E6B-460C-43AB-92CD-6937A52B91F0}"/>
+                <a16:creationId xmlns:a16="http://schemas.microsoft.com/office/drawing/2014/main" xmlns="" id="{793C0E6B-460C-43AB-92CD-6937A52B91F0}"/>
               </a:ext>
             </a:extLst>
           </p:cNvPr>
@@ -1846,7 +1847,7 @@
           <p:cNvPr id="9" name="Symbol zastępczy numeru slajdu 8">
             <a:extLst>
               <a:ext uri="{FF2B5EF4-FFF2-40B4-BE49-F238E27FC236}">
-                <a16:creationId xmlns:a16="http://schemas.microsoft.com/office/drawing/2014/main" id="{C9202972-0130-4C20-803E-F8F4F5E21E49}"/>
+                <a16:creationId xmlns:a16="http://schemas.microsoft.com/office/drawing/2014/main" xmlns="" id="{C9202972-0130-4C20-803E-F8F4F5E21E49}"/>
               </a:ext>
             </a:extLst>
           </p:cNvPr>
@@ -1905,7 +1906,7 @@
           <p:cNvPr id="2" name="Tytuł 1">
             <a:extLst>
               <a:ext uri="{FF2B5EF4-FFF2-40B4-BE49-F238E27FC236}">
-                <a16:creationId xmlns:a16="http://schemas.microsoft.com/office/drawing/2014/main" id="{934CA0F1-30BF-4EB0-9D32-E44575B2A4DD}"/>
+                <a16:creationId xmlns:a16="http://schemas.microsoft.com/office/drawing/2014/main" xmlns="" id="{934CA0F1-30BF-4EB0-9D32-E44575B2A4DD}"/>
               </a:ext>
             </a:extLst>
           </p:cNvPr>
@@ -1933,7 +1934,7 @@
           <p:cNvPr id="3" name="Symbol zastępczy daty 2">
             <a:extLst>
               <a:ext uri="{FF2B5EF4-FFF2-40B4-BE49-F238E27FC236}">
-                <a16:creationId xmlns:a16="http://schemas.microsoft.com/office/drawing/2014/main" id="{3A5A0DC7-664C-4D82-971B-7D4173EEA6A5}"/>
+                <a16:creationId xmlns:a16="http://schemas.microsoft.com/office/drawing/2014/main" xmlns="" id="{3A5A0DC7-664C-4D82-971B-7D4173EEA6A5}"/>
               </a:ext>
             </a:extLst>
           </p:cNvPr>
@@ -1951,7 +1952,7 @@
           <a:p>
             <a:fld id="{3637D940-39A0-467B-8185-43E8B1E8136A}" type="datetimeFigureOut">
               <a:rPr lang="pl-PL" smtClean="0"/>
-              <a:t>2019-02-22</a:t>
+              <a:t>2019-03-02</a:t>
             </a:fld>
             <a:endParaRPr lang="pl-PL"/>
           </a:p>
@@ -1962,7 +1963,7 @@
           <p:cNvPr id="4" name="Symbol zastępczy stopki 3">
             <a:extLst>
               <a:ext uri="{FF2B5EF4-FFF2-40B4-BE49-F238E27FC236}">
-                <a16:creationId xmlns:a16="http://schemas.microsoft.com/office/drawing/2014/main" id="{5A24E753-9FBA-43B0-98E1-7592D3EEF602}"/>
+                <a16:creationId xmlns:a16="http://schemas.microsoft.com/office/drawing/2014/main" xmlns="" id="{5A24E753-9FBA-43B0-98E1-7592D3EEF602}"/>
               </a:ext>
             </a:extLst>
           </p:cNvPr>
@@ -1987,7 +1988,7 @@
           <p:cNvPr id="5" name="Symbol zastępczy numeru slajdu 4">
             <a:extLst>
               <a:ext uri="{FF2B5EF4-FFF2-40B4-BE49-F238E27FC236}">
-                <a16:creationId xmlns:a16="http://schemas.microsoft.com/office/drawing/2014/main" id="{1EFEC706-7487-42AF-9BE2-BB6E969565ED}"/>
+                <a16:creationId xmlns:a16="http://schemas.microsoft.com/office/drawing/2014/main" xmlns="" id="{1EFEC706-7487-42AF-9BE2-BB6E969565ED}"/>
               </a:ext>
             </a:extLst>
           </p:cNvPr>
@@ -2046,7 +2047,7 @@
           <p:cNvPr id="2" name="Symbol zastępczy daty 1">
             <a:extLst>
               <a:ext uri="{FF2B5EF4-FFF2-40B4-BE49-F238E27FC236}">
-                <a16:creationId xmlns:a16="http://schemas.microsoft.com/office/drawing/2014/main" id="{C4473CA7-6296-4919-B10E-452F8F64077C}"/>
+                <a16:creationId xmlns:a16="http://schemas.microsoft.com/office/drawing/2014/main" xmlns="" id="{C4473CA7-6296-4919-B10E-452F8F64077C}"/>
               </a:ext>
             </a:extLst>
           </p:cNvPr>
@@ -2064,7 +2065,7 @@
           <a:p>
             <a:fld id="{3637D940-39A0-467B-8185-43E8B1E8136A}" type="datetimeFigureOut">
               <a:rPr lang="pl-PL" smtClean="0"/>
-              <a:t>2019-02-22</a:t>
+              <a:t>2019-03-02</a:t>
             </a:fld>
             <a:endParaRPr lang="pl-PL"/>
           </a:p>
@@ -2075,7 +2076,7 @@
           <p:cNvPr id="3" name="Symbol zastępczy stopki 2">
             <a:extLst>
               <a:ext uri="{FF2B5EF4-FFF2-40B4-BE49-F238E27FC236}">
-                <a16:creationId xmlns:a16="http://schemas.microsoft.com/office/drawing/2014/main" id="{FB2AE257-6473-472E-89E5-79A7DC163790}"/>
+                <a16:creationId xmlns:a16="http://schemas.microsoft.com/office/drawing/2014/main" xmlns="" id="{FB2AE257-6473-472E-89E5-79A7DC163790}"/>
               </a:ext>
             </a:extLst>
           </p:cNvPr>
@@ -2100,7 +2101,7 @@
           <p:cNvPr id="4" name="Symbol zastępczy numeru slajdu 3">
             <a:extLst>
               <a:ext uri="{FF2B5EF4-FFF2-40B4-BE49-F238E27FC236}">
-                <a16:creationId xmlns:a16="http://schemas.microsoft.com/office/drawing/2014/main" id="{33402BCF-FCFC-4472-AAF2-8ADB4BACB74C}"/>
+                <a16:creationId xmlns:a16="http://schemas.microsoft.com/office/drawing/2014/main" xmlns="" id="{33402BCF-FCFC-4472-AAF2-8ADB4BACB74C}"/>
               </a:ext>
             </a:extLst>
           </p:cNvPr>
@@ -2159,7 +2160,7 @@
           <p:cNvPr id="2" name="Tytuł 1">
             <a:extLst>
               <a:ext uri="{FF2B5EF4-FFF2-40B4-BE49-F238E27FC236}">
-                <a16:creationId xmlns:a16="http://schemas.microsoft.com/office/drawing/2014/main" id="{35BBC211-5601-477B-A560-FA802B915FCB}"/>
+                <a16:creationId xmlns:a16="http://schemas.microsoft.com/office/drawing/2014/main" xmlns="" id="{35BBC211-5601-477B-A560-FA802B915FCB}"/>
               </a:ext>
             </a:extLst>
           </p:cNvPr>
@@ -2196,7 +2197,7 @@
           <p:cNvPr id="3" name="Symbol zastępczy zawartości 2">
             <a:extLst>
               <a:ext uri="{FF2B5EF4-FFF2-40B4-BE49-F238E27FC236}">
-                <a16:creationId xmlns:a16="http://schemas.microsoft.com/office/drawing/2014/main" id="{2BE455F1-5D61-47CC-A935-9D3AFAE10DD7}"/>
+                <a16:creationId xmlns:a16="http://schemas.microsoft.com/office/drawing/2014/main" xmlns="" id="{2BE455F1-5D61-47CC-A935-9D3AFAE10DD7}"/>
               </a:ext>
             </a:extLst>
           </p:cNvPr>
@@ -2286,7 +2287,7 @@
           <p:cNvPr id="4" name="Symbol zastępczy tekstu 3">
             <a:extLst>
               <a:ext uri="{FF2B5EF4-FFF2-40B4-BE49-F238E27FC236}">
-                <a16:creationId xmlns:a16="http://schemas.microsoft.com/office/drawing/2014/main" id="{7DAE2D74-2729-4840-B82C-48D4C56B9E58}"/>
+                <a16:creationId xmlns:a16="http://schemas.microsoft.com/office/drawing/2014/main" xmlns="" id="{7DAE2D74-2729-4840-B82C-48D4C56B9E58}"/>
               </a:ext>
             </a:extLst>
           </p:cNvPr>
@@ -2357,7 +2358,7 @@
           <p:cNvPr id="5" name="Symbol zastępczy daty 4">
             <a:extLst>
               <a:ext uri="{FF2B5EF4-FFF2-40B4-BE49-F238E27FC236}">
-                <a16:creationId xmlns:a16="http://schemas.microsoft.com/office/drawing/2014/main" id="{2399D579-C04A-48CB-A546-47585595906A}"/>
+                <a16:creationId xmlns:a16="http://schemas.microsoft.com/office/drawing/2014/main" xmlns="" id="{2399D579-C04A-48CB-A546-47585595906A}"/>
               </a:ext>
             </a:extLst>
           </p:cNvPr>
@@ -2375,7 +2376,7 @@
           <a:p>
             <a:fld id="{3637D940-39A0-467B-8185-43E8B1E8136A}" type="datetimeFigureOut">
               <a:rPr lang="pl-PL" smtClean="0"/>
-              <a:t>2019-02-22</a:t>
+              <a:t>2019-03-02</a:t>
             </a:fld>
             <a:endParaRPr lang="pl-PL"/>
           </a:p>
@@ -2386,7 +2387,7 @@
           <p:cNvPr id="6" name="Symbol zastępczy stopki 5">
             <a:extLst>
               <a:ext uri="{FF2B5EF4-FFF2-40B4-BE49-F238E27FC236}">
-                <a16:creationId xmlns:a16="http://schemas.microsoft.com/office/drawing/2014/main" id="{2CF12CF5-9137-4A6D-8DBE-4E9EBB02E620}"/>
+                <a16:creationId xmlns:a16="http://schemas.microsoft.com/office/drawing/2014/main" xmlns="" id="{2CF12CF5-9137-4A6D-8DBE-4E9EBB02E620}"/>
               </a:ext>
             </a:extLst>
           </p:cNvPr>
@@ -2411,7 +2412,7 @@
           <p:cNvPr id="7" name="Symbol zastępczy numeru slajdu 6">
             <a:extLst>
               <a:ext uri="{FF2B5EF4-FFF2-40B4-BE49-F238E27FC236}">
-                <a16:creationId xmlns:a16="http://schemas.microsoft.com/office/drawing/2014/main" id="{7DC80A17-E2B8-451A-BFE2-A8CBEBEA30D5}"/>
+                <a16:creationId xmlns:a16="http://schemas.microsoft.com/office/drawing/2014/main" xmlns="" id="{7DC80A17-E2B8-451A-BFE2-A8CBEBEA30D5}"/>
               </a:ext>
             </a:extLst>
           </p:cNvPr>
@@ -2470,7 +2471,7 @@
           <p:cNvPr id="2" name="Tytuł 1">
             <a:extLst>
               <a:ext uri="{FF2B5EF4-FFF2-40B4-BE49-F238E27FC236}">
-                <a16:creationId xmlns:a16="http://schemas.microsoft.com/office/drawing/2014/main" id="{9736B682-A919-41DE-96D9-2524AD144847}"/>
+                <a16:creationId xmlns:a16="http://schemas.microsoft.com/office/drawing/2014/main" xmlns="" id="{9736B682-A919-41DE-96D9-2524AD144847}"/>
               </a:ext>
             </a:extLst>
           </p:cNvPr>
@@ -2507,7 +2508,7 @@
           <p:cNvPr id="3" name="Symbol zastępczy obrazu 2">
             <a:extLst>
               <a:ext uri="{FF2B5EF4-FFF2-40B4-BE49-F238E27FC236}">
-                <a16:creationId xmlns:a16="http://schemas.microsoft.com/office/drawing/2014/main" id="{C8183C3E-C1FE-454C-A718-8C2361352857}"/>
+                <a16:creationId xmlns:a16="http://schemas.microsoft.com/office/drawing/2014/main" xmlns="" id="{C8183C3E-C1FE-454C-A718-8C2361352857}"/>
               </a:ext>
             </a:extLst>
           </p:cNvPr>
@@ -2574,7 +2575,7 @@
           <p:cNvPr id="4" name="Symbol zastępczy tekstu 3">
             <a:extLst>
               <a:ext uri="{FF2B5EF4-FFF2-40B4-BE49-F238E27FC236}">
-                <a16:creationId xmlns:a16="http://schemas.microsoft.com/office/drawing/2014/main" id="{AF6224F1-E256-46BF-B770-B4AA49ED1864}"/>
+                <a16:creationId xmlns:a16="http://schemas.microsoft.com/office/drawing/2014/main" xmlns="" id="{AF6224F1-E256-46BF-B770-B4AA49ED1864}"/>
               </a:ext>
             </a:extLst>
           </p:cNvPr>
@@ -2645,7 +2646,7 @@
           <p:cNvPr id="5" name="Symbol zastępczy daty 4">
             <a:extLst>
               <a:ext uri="{FF2B5EF4-FFF2-40B4-BE49-F238E27FC236}">
-                <a16:creationId xmlns:a16="http://schemas.microsoft.com/office/drawing/2014/main" id="{CA40690F-594A-4E43-B38D-84C89CFBDFCB}"/>
+                <a16:creationId xmlns:a16="http://schemas.microsoft.com/office/drawing/2014/main" xmlns="" id="{CA40690F-594A-4E43-B38D-84C89CFBDFCB}"/>
               </a:ext>
             </a:extLst>
           </p:cNvPr>
@@ -2663,7 +2664,7 @@
           <a:p>
             <a:fld id="{3637D940-39A0-467B-8185-43E8B1E8136A}" type="datetimeFigureOut">
               <a:rPr lang="pl-PL" smtClean="0"/>
-              <a:t>2019-02-22</a:t>
+              <a:t>2019-03-02</a:t>
             </a:fld>
             <a:endParaRPr lang="pl-PL"/>
           </a:p>
@@ -2674,7 +2675,7 @@
           <p:cNvPr id="6" name="Symbol zastępczy stopki 5">
             <a:extLst>
               <a:ext uri="{FF2B5EF4-FFF2-40B4-BE49-F238E27FC236}">
-                <a16:creationId xmlns:a16="http://schemas.microsoft.com/office/drawing/2014/main" id="{4985EC23-2EF1-4853-816F-314811145551}"/>
+                <a16:creationId xmlns:a16="http://schemas.microsoft.com/office/drawing/2014/main" xmlns="" id="{4985EC23-2EF1-4853-816F-314811145551}"/>
               </a:ext>
             </a:extLst>
           </p:cNvPr>
@@ -2699,7 +2700,7 @@
           <p:cNvPr id="7" name="Symbol zastępczy numeru slajdu 6">
             <a:extLst>
               <a:ext uri="{FF2B5EF4-FFF2-40B4-BE49-F238E27FC236}">
-                <a16:creationId xmlns:a16="http://schemas.microsoft.com/office/drawing/2014/main" id="{5F069839-CC16-44CC-9AFF-7766CC93569D}"/>
+                <a16:creationId xmlns:a16="http://schemas.microsoft.com/office/drawing/2014/main" xmlns="" id="{5F069839-CC16-44CC-9AFF-7766CC93569D}"/>
               </a:ext>
             </a:extLst>
           </p:cNvPr>
@@ -2763,7 +2764,7 @@
           <p:cNvPr id="2" name="Symbol zastępczy tytułu 1">
             <a:extLst>
               <a:ext uri="{FF2B5EF4-FFF2-40B4-BE49-F238E27FC236}">
-                <a16:creationId xmlns:a16="http://schemas.microsoft.com/office/drawing/2014/main" id="{6C502013-1201-4CBE-8217-2181F8629233}"/>
+                <a16:creationId xmlns:a16="http://schemas.microsoft.com/office/drawing/2014/main" xmlns="" id="{6C502013-1201-4CBE-8217-2181F8629233}"/>
               </a:ext>
             </a:extLst>
           </p:cNvPr>
@@ -2801,7 +2802,7 @@
           <p:cNvPr id="3" name="Symbol zastępczy tekstu 2">
             <a:extLst>
               <a:ext uri="{FF2B5EF4-FFF2-40B4-BE49-F238E27FC236}">
-                <a16:creationId xmlns:a16="http://schemas.microsoft.com/office/drawing/2014/main" id="{A9128EC0-408D-4315-9B47-377E559C8CAF}"/>
+                <a16:creationId xmlns:a16="http://schemas.microsoft.com/office/drawing/2014/main" xmlns="" id="{A9128EC0-408D-4315-9B47-377E559C8CAF}"/>
               </a:ext>
             </a:extLst>
           </p:cNvPr>
@@ -2868,7 +2869,7 @@
           <p:cNvPr id="4" name="Symbol zastępczy daty 3">
             <a:extLst>
               <a:ext uri="{FF2B5EF4-FFF2-40B4-BE49-F238E27FC236}">
-                <a16:creationId xmlns:a16="http://schemas.microsoft.com/office/drawing/2014/main" id="{385C24A4-9332-40D7-B60C-40B29A22BF8F}"/>
+                <a16:creationId xmlns:a16="http://schemas.microsoft.com/office/drawing/2014/main" xmlns="" id="{385C24A4-9332-40D7-B60C-40B29A22BF8F}"/>
               </a:ext>
             </a:extLst>
           </p:cNvPr>
@@ -2904,7 +2905,7 @@
           <a:p>
             <a:fld id="{3637D940-39A0-467B-8185-43E8B1E8136A}" type="datetimeFigureOut">
               <a:rPr lang="pl-PL" smtClean="0"/>
-              <a:t>2019-02-22</a:t>
+              <a:t>2019-03-02</a:t>
             </a:fld>
             <a:endParaRPr lang="pl-PL"/>
           </a:p>
@@ -2915,7 +2916,7 @@
           <p:cNvPr id="5" name="Symbol zastępczy stopki 4">
             <a:extLst>
               <a:ext uri="{FF2B5EF4-FFF2-40B4-BE49-F238E27FC236}">
-                <a16:creationId xmlns:a16="http://schemas.microsoft.com/office/drawing/2014/main" id="{9FC5405A-6130-4859-9E9B-FC152D8DECDA}"/>
+                <a16:creationId xmlns:a16="http://schemas.microsoft.com/office/drawing/2014/main" xmlns="" id="{9FC5405A-6130-4859-9E9B-FC152D8DECDA}"/>
               </a:ext>
             </a:extLst>
           </p:cNvPr>
@@ -2958,7 +2959,7 @@
           <p:cNvPr id="6" name="Symbol zastępczy numeru slajdu 5">
             <a:extLst>
               <a:ext uri="{FF2B5EF4-FFF2-40B4-BE49-F238E27FC236}">
-                <a16:creationId xmlns:a16="http://schemas.microsoft.com/office/drawing/2014/main" id="{AFE69180-FA59-4C5C-B734-9BB266059457}"/>
+                <a16:creationId xmlns:a16="http://schemas.microsoft.com/office/drawing/2014/main" xmlns="" id="{AFE69180-FA59-4C5C-B734-9BB266059457}"/>
               </a:ext>
             </a:extLst>
           </p:cNvPr>
@@ -3326,7 +3327,7 @@
           <p:cNvPr id="4" name="Prostokąt 3">
             <a:extLst>
               <a:ext uri="{FF2B5EF4-FFF2-40B4-BE49-F238E27FC236}">
-                <a16:creationId xmlns:a16="http://schemas.microsoft.com/office/drawing/2014/main" id="{FC41D846-6167-4851-9C0F-69D586146FBE}"/>
+                <a16:creationId xmlns:a16="http://schemas.microsoft.com/office/drawing/2014/main" xmlns="" id="{FC41D846-6167-4851-9C0F-69D586146FBE}"/>
               </a:ext>
             </a:extLst>
           </p:cNvPr>
@@ -3335,7 +3336,7 @@
         </p:nvSpPr>
         <p:spPr>
           <a:xfrm>
-            <a:off x="1222853" y="668954"/>
+            <a:off x="1271464" y="548680"/>
             <a:ext cx="9746294" cy="5382304"/>
           </a:xfrm>
           <a:prstGeom prst="rect">
@@ -3377,7 +3378,7 @@
           <p:cNvPr id="8" name="Łącznik prosty 7">
             <a:extLst>
               <a:ext uri="{FF2B5EF4-FFF2-40B4-BE49-F238E27FC236}">
-                <a16:creationId xmlns:a16="http://schemas.microsoft.com/office/drawing/2014/main" id="{28B347CD-D440-4457-851A-22DF2E7CDD82}"/>
+                <a16:creationId xmlns:a16="http://schemas.microsoft.com/office/drawing/2014/main" xmlns="" id="{28B347CD-D440-4457-851A-22DF2E7CDD82}"/>
               </a:ext>
             </a:extLst>
           </p:cNvPr>
@@ -3420,7 +3421,7 @@
           <p:cNvPr id="15" name="Łącznik prosty 14">
             <a:extLst>
               <a:ext uri="{FF2B5EF4-FFF2-40B4-BE49-F238E27FC236}">
-                <a16:creationId xmlns:a16="http://schemas.microsoft.com/office/drawing/2014/main" id="{41FFB07E-22C5-4D13-B260-7622522CF9D7}"/>
+                <a16:creationId xmlns:a16="http://schemas.microsoft.com/office/drawing/2014/main" xmlns="" id="{41FFB07E-22C5-4D13-B260-7622522CF9D7}"/>
               </a:ext>
             </a:extLst>
           </p:cNvPr>
@@ -3463,7 +3464,7 @@
           <p:cNvPr id="32" name="Łącznik prosty 31">
             <a:extLst>
               <a:ext uri="{FF2B5EF4-FFF2-40B4-BE49-F238E27FC236}">
-                <a16:creationId xmlns:a16="http://schemas.microsoft.com/office/drawing/2014/main" id="{D32A498F-57BE-4EE3-BB8E-C480DBBB279A}"/>
+                <a16:creationId xmlns:a16="http://schemas.microsoft.com/office/drawing/2014/main" xmlns="" id="{D32A498F-57BE-4EE3-BB8E-C480DBBB279A}"/>
               </a:ext>
             </a:extLst>
           </p:cNvPr>
@@ -3506,7 +3507,7 @@
           <p:cNvPr id="35" name="Łącznik prosty 34">
             <a:extLst>
               <a:ext uri="{FF2B5EF4-FFF2-40B4-BE49-F238E27FC236}">
-                <a16:creationId xmlns:a16="http://schemas.microsoft.com/office/drawing/2014/main" id="{8F8E5D80-6BB7-4FA8-A011-5B4985908142}"/>
+                <a16:creationId xmlns:a16="http://schemas.microsoft.com/office/drawing/2014/main" xmlns="" id="{8F8E5D80-6BB7-4FA8-A011-5B4985908142}"/>
               </a:ext>
             </a:extLst>
           </p:cNvPr>
@@ -3549,7 +3550,7 @@
           <p:cNvPr id="36" name="Łącznik prosty 35">
             <a:extLst>
               <a:ext uri="{FF2B5EF4-FFF2-40B4-BE49-F238E27FC236}">
-                <a16:creationId xmlns:a16="http://schemas.microsoft.com/office/drawing/2014/main" id="{3BA3D497-F0B7-4B42-B1CB-2A40C5884C6C}"/>
+                <a16:creationId xmlns:a16="http://schemas.microsoft.com/office/drawing/2014/main" xmlns="" id="{3BA3D497-F0B7-4B42-B1CB-2A40C5884C6C}"/>
               </a:ext>
             </a:extLst>
           </p:cNvPr>
@@ -3592,7 +3593,7 @@
           <p:cNvPr id="37" name="Łącznik prosty 36">
             <a:extLst>
               <a:ext uri="{FF2B5EF4-FFF2-40B4-BE49-F238E27FC236}">
-                <a16:creationId xmlns:a16="http://schemas.microsoft.com/office/drawing/2014/main" id="{C61E91E5-C72F-4320-A431-0DB7D09DF8E6}"/>
+                <a16:creationId xmlns:a16="http://schemas.microsoft.com/office/drawing/2014/main" xmlns="" id="{C61E91E5-C72F-4320-A431-0DB7D09DF8E6}"/>
               </a:ext>
             </a:extLst>
           </p:cNvPr>
@@ -3635,7 +3636,7 @@
           <p:cNvPr id="38" name="Łącznik prosty 37">
             <a:extLst>
               <a:ext uri="{FF2B5EF4-FFF2-40B4-BE49-F238E27FC236}">
-                <a16:creationId xmlns:a16="http://schemas.microsoft.com/office/drawing/2014/main" id="{2AD4071D-38A1-4BFF-8A3C-B213AC14C817}"/>
+                <a16:creationId xmlns:a16="http://schemas.microsoft.com/office/drawing/2014/main" xmlns="" id="{2AD4071D-38A1-4BFF-8A3C-B213AC14C817}"/>
               </a:ext>
             </a:extLst>
           </p:cNvPr>
@@ -3678,7 +3679,7 @@
           <p:cNvPr id="39" name="Łącznik prosty 38">
             <a:extLst>
               <a:ext uri="{FF2B5EF4-FFF2-40B4-BE49-F238E27FC236}">
-                <a16:creationId xmlns:a16="http://schemas.microsoft.com/office/drawing/2014/main" id="{F6DC2378-E32E-449C-A2E8-705912C845CC}"/>
+                <a16:creationId xmlns:a16="http://schemas.microsoft.com/office/drawing/2014/main" xmlns="" id="{F6DC2378-E32E-449C-A2E8-705912C845CC}"/>
               </a:ext>
             </a:extLst>
           </p:cNvPr>
@@ -3721,7 +3722,7 @@
           <p:cNvPr id="40" name="Łącznik prosty 39">
             <a:extLst>
               <a:ext uri="{FF2B5EF4-FFF2-40B4-BE49-F238E27FC236}">
-                <a16:creationId xmlns:a16="http://schemas.microsoft.com/office/drawing/2014/main" id="{9FD36189-513C-4D1B-98FD-AC36FB92B2D6}"/>
+                <a16:creationId xmlns:a16="http://schemas.microsoft.com/office/drawing/2014/main" xmlns="" id="{9FD36189-513C-4D1B-98FD-AC36FB92B2D6}"/>
               </a:ext>
             </a:extLst>
           </p:cNvPr>
@@ -3764,7 +3765,7 @@
           <p:cNvPr id="41" name="Łącznik prosty 40">
             <a:extLst>
               <a:ext uri="{FF2B5EF4-FFF2-40B4-BE49-F238E27FC236}">
-                <a16:creationId xmlns:a16="http://schemas.microsoft.com/office/drawing/2014/main" id="{5A21BB93-3EFB-406A-9B63-B76CD77AB0D2}"/>
+                <a16:creationId xmlns:a16="http://schemas.microsoft.com/office/drawing/2014/main" xmlns="" id="{5A21BB93-3EFB-406A-9B63-B76CD77AB0D2}"/>
               </a:ext>
             </a:extLst>
           </p:cNvPr>
@@ -3807,7 +3808,7 @@
           <p:cNvPr id="42" name="Łącznik prosty 41">
             <a:extLst>
               <a:ext uri="{FF2B5EF4-FFF2-40B4-BE49-F238E27FC236}">
-                <a16:creationId xmlns:a16="http://schemas.microsoft.com/office/drawing/2014/main" id="{4BB4C968-917F-4174-AFBE-514DFA456C69}"/>
+                <a16:creationId xmlns:a16="http://schemas.microsoft.com/office/drawing/2014/main" xmlns="" id="{4BB4C968-917F-4174-AFBE-514DFA456C69}"/>
               </a:ext>
             </a:extLst>
           </p:cNvPr>
@@ -3850,7 +3851,7 @@
           <p:cNvPr id="43" name="Łącznik prosty 42">
             <a:extLst>
               <a:ext uri="{FF2B5EF4-FFF2-40B4-BE49-F238E27FC236}">
-                <a16:creationId xmlns:a16="http://schemas.microsoft.com/office/drawing/2014/main" id="{A0BE5211-AB35-4E99-9A1B-3DA5549273C2}"/>
+                <a16:creationId xmlns:a16="http://schemas.microsoft.com/office/drawing/2014/main" xmlns="" id="{A0BE5211-AB35-4E99-9A1B-3DA5549273C2}"/>
               </a:ext>
             </a:extLst>
           </p:cNvPr>
@@ -3893,7 +3894,7 @@
           <p:cNvPr id="44" name="Łącznik prosty 43">
             <a:extLst>
               <a:ext uri="{FF2B5EF4-FFF2-40B4-BE49-F238E27FC236}">
-                <a16:creationId xmlns:a16="http://schemas.microsoft.com/office/drawing/2014/main" id="{6D3DF4B0-2096-4DA4-856B-28AC3783A563}"/>
+                <a16:creationId xmlns:a16="http://schemas.microsoft.com/office/drawing/2014/main" xmlns="" id="{6D3DF4B0-2096-4DA4-856B-28AC3783A563}"/>
               </a:ext>
             </a:extLst>
           </p:cNvPr>
@@ -3936,7 +3937,7 @@
           <p:cNvPr id="51" name="Łącznik prosty 50">
             <a:extLst>
               <a:ext uri="{FF2B5EF4-FFF2-40B4-BE49-F238E27FC236}">
-                <a16:creationId xmlns:a16="http://schemas.microsoft.com/office/drawing/2014/main" id="{A89BFF10-1315-4F75-89C5-3C1ECE2E250D}"/>
+                <a16:creationId xmlns:a16="http://schemas.microsoft.com/office/drawing/2014/main" xmlns="" id="{A89BFF10-1315-4F75-89C5-3C1ECE2E250D}"/>
               </a:ext>
             </a:extLst>
           </p:cNvPr>
@@ -3979,7 +3980,7 @@
           <p:cNvPr id="52" name="Łącznik prosty 51">
             <a:extLst>
               <a:ext uri="{FF2B5EF4-FFF2-40B4-BE49-F238E27FC236}">
-                <a16:creationId xmlns:a16="http://schemas.microsoft.com/office/drawing/2014/main" id="{74A27586-AD5E-47C5-865B-63A569962038}"/>
+                <a16:creationId xmlns:a16="http://schemas.microsoft.com/office/drawing/2014/main" xmlns="" id="{74A27586-AD5E-47C5-865B-63A569962038}"/>
               </a:ext>
             </a:extLst>
           </p:cNvPr>
@@ -4022,7 +4023,7 @@
           <p:cNvPr id="53" name="Łącznik prosty 52">
             <a:extLst>
               <a:ext uri="{FF2B5EF4-FFF2-40B4-BE49-F238E27FC236}">
-                <a16:creationId xmlns:a16="http://schemas.microsoft.com/office/drawing/2014/main" id="{44262F17-59F3-4C2D-971D-AD224677CC33}"/>
+                <a16:creationId xmlns:a16="http://schemas.microsoft.com/office/drawing/2014/main" xmlns="" id="{44262F17-59F3-4C2D-971D-AD224677CC33}"/>
               </a:ext>
             </a:extLst>
           </p:cNvPr>
@@ -4065,7 +4066,7 @@
           <p:cNvPr id="55" name="Łącznik prosty 54">
             <a:extLst>
               <a:ext uri="{FF2B5EF4-FFF2-40B4-BE49-F238E27FC236}">
-                <a16:creationId xmlns:a16="http://schemas.microsoft.com/office/drawing/2014/main" id="{81474075-CC96-4960-8DDD-C0C7C81C62D4}"/>
+                <a16:creationId xmlns:a16="http://schemas.microsoft.com/office/drawing/2014/main" xmlns="" id="{81474075-CC96-4960-8DDD-C0C7C81C62D4}"/>
               </a:ext>
             </a:extLst>
           </p:cNvPr>
@@ -4108,7 +4109,7 @@
           <p:cNvPr id="56" name="Łącznik prosty 55">
             <a:extLst>
               <a:ext uri="{FF2B5EF4-FFF2-40B4-BE49-F238E27FC236}">
-                <a16:creationId xmlns:a16="http://schemas.microsoft.com/office/drawing/2014/main" id="{F6606FD7-7388-4391-A2B8-EC4A47EF52E8}"/>
+                <a16:creationId xmlns:a16="http://schemas.microsoft.com/office/drawing/2014/main" xmlns="" id="{F6606FD7-7388-4391-A2B8-EC4A47EF52E8}"/>
               </a:ext>
             </a:extLst>
           </p:cNvPr>
@@ -4151,7 +4152,7 @@
           <p:cNvPr id="57" name="Łącznik prosty 56">
             <a:extLst>
               <a:ext uri="{FF2B5EF4-FFF2-40B4-BE49-F238E27FC236}">
-                <a16:creationId xmlns:a16="http://schemas.microsoft.com/office/drawing/2014/main" id="{EF0E4DB0-AF8F-4727-95B0-0EBE4AADA960}"/>
+                <a16:creationId xmlns:a16="http://schemas.microsoft.com/office/drawing/2014/main" xmlns="" id="{EF0E4DB0-AF8F-4727-95B0-0EBE4AADA960}"/>
               </a:ext>
             </a:extLst>
           </p:cNvPr>
@@ -4194,7 +4195,7 @@
           <p:cNvPr id="58" name="Łącznik prosty 57">
             <a:extLst>
               <a:ext uri="{FF2B5EF4-FFF2-40B4-BE49-F238E27FC236}">
-                <a16:creationId xmlns:a16="http://schemas.microsoft.com/office/drawing/2014/main" id="{AF67675A-019A-40D8-A9BF-B6E2D2AB3233}"/>
+                <a16:creationId xmlns:a16="http://schemas.microsoft.com/office/drawing/2014/main" xmlns="" id="{AF67675A-019A-40D8-A9BF-B6E2D2AB3233}"/>
               </a:ext>
             </a:extLst>
           </p:cNvPr>
@@ -4237,7 +4238,7 @@
           <p:cNvPr id="59" name="Łącznik prosty 58">
             <a:extLst>
               <a:ext uri="{FF2B5EF4-FFF2-40B4-BE49-F238E27FC236}">
-                <a16:creationId xmlns:a16="http://schemas.microsoft.com/office/drawing/2014/main" id="{561BBF20-60AF-48FC-ABE8-2A55DFC96153}"/>
+                <a16:creationId xmlns:a16="http://schemas.microsoft.com/office/drawing/2014/main" xmlns="" id="{561BBF20-60AF-48FC-ABE8-2A55DFC96153}"/>
               </a:ext>
             </a:extLst>
           </p:cNvPr>
@@ -4275,14 +4276,14 @@
           </a:fontRef>
         </p:style>
       </p:cxnSp>
-      <mc:AlternateContent xmlns:mc="http://schemas.openxmlformats.org/markup-compatibility/2006">
-        <mc:Choice xmlns:a14="http://schemas.microsoft.com/office/drawing/2010/main" Requires="a14">
+      <mc:AlternateContent xmlns:mc="http://schemas.openxmlformats.org/markup-compatibility/2006" xmlns:a14="http://schemas.microsoft.com/office/drawing/2010/main">
+        <mc:Choice Requires="a14">
           <p:sp>
             <p:nvSpPr>
               <p:cNvPr id="60" name="pole tekstowe 59">
                 <a:extLst>
                   <a:ext uri="{FF2B5EF4-FFF2-40B4-BE49-F238E27FC236}">
-                    <a16:creationId xmlns:a16="http://schemas.microsoft.com/office/drawing/2014/main" id="{F910BA4E-93D4-4DFE-BAEA-759979DB0100}"/>
+                    <a16:creationId xmlns:a16="http://schemas.microsoft.com/office/drawing/2014/main" xmlns="" id="{F910BA4E-93D4-4DFE-BAEA-759979DB0100}"/>
                   </a:ext>
                 </a:extLst>
               </p:cNvPr>
@@ -4305,6 +4306,7 @@
               </a:bodyPr>
               <a:lstStyle/>
               <a:p>
+                <a:pPr/>
                 <a14:m>
                   <m:oMathPara xmlns:m="http://schemas.openxmlformats.org/officeDocument/2006/math">
                     <m:oMathParaPr>
@@ -4315,7 +4317,7 @@
                         <m:sSubPr>
                           <m:ctrlPr>
                             <a:rPr lang="pl-PL" b="0" i="1" smtClean="0">
-                              <a:latin typeface="Cambria Math" panose="02040503050406030204" pitchFamily="18" charset="0"/>
+                              <a:latin typeface="Cambria Math"/>
                             </a:rPr>
                           </m:ctrlPr>
                         </m:sSubPr>
@@ -4344,7 +4346,7 @@
             </p:txBody>
           </p:sp>
         </mc:Choice>
-        <mc:Fallback>
+        <mc:Fallback xmlns="">
           <p:sp>
             <p:nvSpPr>
               <p:cNvPr id="60" name="pole tekstowe 59">
@@ -4389,14 +4391,14 @@
           </p:sp>
         </mc:Fallback>
       </mc:AlternateContent>
-      <mc:AlternateContent xmlns:mc="http://schemas.openxmlformats.org/markup-compatibility/2006">
-        <mc:Choice xmlns:a14="http://schemas.microsoft.com/office/drawing/2010/main" Requires="a14">
+      <mc:AlternateContent xmlns:mc="http://schemas.openxmlformats.org/markup-compatibility/2006" xmlns:a14="http://schemas.microsoft.com/office/drawing/2010/main">
+        <mc:Choice Requires="a14">
           <p:sp>
             <p:nvSpPr>
               <p:cNvPr id="61" name="pole tekstowe 60">
                 <a:extLst>
                   <a:ext uri="{FF2B5EF4-FFF2-40B4-BE49-F238E27FC236}">
-                    <a16:creationId xmlns:a16="http://schemas.microsoft.com/office/drawing/2014/main" id="{E71C4345-C20E-4062-BC19-8E2D2FCB88A4}"/>
+                    <a16:creationId xmlns:a16="http://schemas.microsoft.com/office/drawing/2014/main" xmlns="" id="{E71C4345-C20E-4062-BC19-8E2D2FCB88A4}"/>
                   </a:ext>
                 </a:extLst>
               </p:cNvPr>
@@ -4419,6 +4421,7 @@
               </a:bodyPr>
               <a:lstStyle/>
               <a:p>
+                <a:pPr/>
                 <a14:m>
                   <m:oMathPara xmlns:m="http://schemas.openxmlformats.org/officeDocument/2006/math">
                     <m:oMathParaPr>
@@ -4429,7 +4432,7 @@
                         <m:sSubPr>
                           <m:ctrlPr>
                             <a:rPr lang="pl-PL" b="0" i="1" smtClean="0">
-                              <a:latin typeface="Cambria Math" panose="02040503050406030204" pitchFamily="18" charset="0"/>
+                              <a:latin typeface="Cambria Math"/>
                             </a:rPr>
                           </m:ctrlPr>
                         </m:sSubPr>
@@ -4458,7 +4461,7 @@
             </p:txBody>
           </p:sp>
         </mc:Choice>
-        <mc:Fallback>
+        <mc:Fallback xmlns="">
           <p:sp>
             <p:nvSpPr>
               <p:cNvPr id="61" name="pole tekstowe 60">
@@ -4503,14 +4506,14 @@
           </p:sp>
         </mc:Fallback>
       </mc:AlternateContent>
-      <mc:AlternateContent xmlns:mc="http://schemas.openxmlformats.org/markup-compatibility/2006">
-        <mc:Choice xmlns:a14="http://schemas.microsoft.com/office/drawing/2010/main" Requires="a14">
+      <mc:AlternateContent xmlns:mc="http://schemas.openxmlformats.org/markup-compatibility/2006" xmlns:a14="http://schemas.microsoft.com/office/drawing/2010/main">
+        <mc:Choice Requires="a14">
           <p:sp>
             <p:nvSpPr>
               <p:cNvPr id="62" name="pole tekstowe 61">
                 <a:extLst>
                   <a:ext uri="{FF2B5EF4-FFF2-40B4-BE49-F238E27FC236}">
-                    <a16:creationId xmlns:a16="http://schemas.microsoft.com/office/drawing/2014/main" id="{1F155692-5BA8-4747-9969-918C1545FE47}"/>
+                    <a16:creationId xmlns:a16="http://schemas.microsoft.com/office/drawing/2014/main" xmlns="" id="{1F155692-5BA8-4747-9969-918C1545FE47}"/>
                   </a:ext>
                 </a:extLst>
               </p:cNvPr>
@@ -4533,6 +4536,7 @@
               </a:bodyPr>
               <a:lstStyle/>
               <a:p>
+                <a:pPr/>
                 <a14:m>
                   <m:oMathPara xmlns:m="http://schemas.openxmlformats.org/officeDocument/2006/math">
                     <m:oMathParaPr>
@@ -4543,7 +4547,7 @@
                         <m:sSubPr>
                           <m:ctrlPr>
                             <a:rPr lang="pl-PL" b="0" i="1" smtClean="0">
-                              <a:latin typeface="Cambria Math" panose="02040503050406030204" pitchFamily="18" charset="0"/>
+                              <a:latin typeface="Cambria Math"/>
                             </a:rPr>
                           </m:ctrlPr>
                         </m:sSubPr>
@@ -4572,7 +4576,7 @@
             </p:txBody>
           </p:sp>
         </mc:Choice>
-        <mc:Fallback>
+        <mc:Fallback xmlns="">
           <p:sp>
             <p:nvSpPr>
               <p:cNvPr id="62" name="pole tekstowe 61">
@@ -4617,14 +4621,14 @@
           </p:sp>
         </mc:Fallback>
       </mc:AlternateContent>
-      <mc:AlternateContent xmlns:mc="http://schemas.openxmlformats.org/markup-compatibility/2006">
-        <mc:Choice xmlns:a14="http://schemas.microsoft.com/office/drawing/2010/main" Requires="a14">
+      <mc:AlternateContent xmlns:mc="http://schemas.openxmlformats.org/markup-compatibility/2006" xmlns:a14="http://schemas.microsoft.com/office/drawing/2010/main">
+        <mc:Choice Requires="a14">
           <p:sp>
             <p:nvSpPr>
               <p:cNvPr id="63" name="pole tekstowe 62">
                 <a:extLst>
                   <a:ext uri="{FF2B5EF4-FFF2-40B4-BE49-F238E27FC236}">
-                    <a16:creationId xmlns:a16="http://schemas.microsoft.com/office/drawing/2014/main" id="{24691DBC-F0D9-4E58-A7BC-4B8A72E3442B}"/>
+                    <a16:creationId xmlns:a16="http://schemas.microsoft.com/office/drawing/2014/main" xmlns="" id="{24691DBC-F0D9-4E58-A7BC-4B8A72E3442B}"/>
                   </a:ext>
                 </a:extLst>
               </p:cNvPr>
@@ -4647,6 +4651,7 @@
               </a:bodyPr>
               <a:lstStyle/>
               <a:p>
+                <a:pPr/>
                 <a14:m>
                   <m:oMathPara xmlns:m="http://schemas.openxmlformats.org/officeDocument/2006/math">
                     <m:oMathParaPr>
@@ -4657,7 +4662,7 @@
                         <m:sSubPr>
                           <m:ctrlPr>
                             <a:rPr lang="pl-PL" b="0" i="1" smtClean="0">
-                              <a:latin typeface="Cambria Math" panose="02040503050406030204" pitchFamily="18" charset="0"/>
+                              <a:latin typeface="Cambria Math"/>
                             </a:rPr>
                           </m:ctrlPr>
                         </m:sSubPr>
@@ -4686,7 +4691,7 @@
             </p:txBody>
           </p:sp>
         </mc:Choice>
-        <mc:Fallback>
+        <mc:Fallback xmlns="">
           <p:sp>
             <p:nvSpPr>
               <p:cNvPr id="63" name="pole tekstowe 62">
@@ -4731,14 +4736,14 @@
           </p:sp>
         </mc:Fallback>
       </mc:AlternateContent>
-      <mc:AlternateContent xmlns:mc="http://schemas.openxmlformats.org/markup-compatibility/2006">
-        <mc:Choice xmlns:a14="http://schemas.microsoft.com/office/drawing/2010/main" Requires="a14">
+      <mc:AlternateContent xmlns:mc="http://schemas.openxmlformats.org/markup-compatibility/2006" xmlns:a14="http://schemas.microsoft.com/office/drawing/2010/main">
+        <mc:Choice Requires="a14">
           <p:sp>
             <p:nvSpPr>
               <p:cNvPr id="64" name="pole tekstowe 63">
                 <a:extLst>
                   <a:ext uri="{FF2B5EF4-FFF2-40B4-BE49-F238E27FC236}">
-                    <a16:creationId xmlns:a16="http://schemas.microsoft.com/office/drawing/2014/main" id="{242177C0-8887-4961-A0B8-784D23343EA8}"/>
+                    <a16:creationId xmlns:a16="http://schemas.microsoft.com/office/drawing/2014/main" xmlns="" id="{242177C0-8887-4961-A0B8-784D23343EA8}"/>
                   </a:ext>
                 </a:extLst>
               </p:cNvPr>
@@ -4761,6 +4766,7 @@
               </a:bodyPr>
               <a:lstStyle/>
               <a:p>
+                <a:pPr/>
                 <a14:m>
                   <m:oMathPara xmlns:m="http://schemas.openxmlformats.org/officeDocument/2006/math">
                     <m:oMathParaPr>
@@ -4771,7 +4777,7 @@
                         <m:sSubPr>
                           <m:ctrlPr>
                             <a:rPr lang="pl-PL" b="0" i="1" smtClean="0">
-                              <a:latin typeface="Cambria Math" panose="02040503050406030204" pitchFamily="18" charset="0"/>
+                              <a:latin typeface="Cambria Math"/>
                             </a:rPr>
                           </m:ctrlPr>
                         </m:sSubPr>
@@ -4800,7 +4806,7 @@
             </p:txBody>
           </p:sp>
         </mc:Choice>
-        <mc:Fallback>
+        <mc:Fallback xmlns="">
           <p:sp>
             <p:nvSpPr>
               <p:cNvPr id="64" name="pole tekstowe 63">
@@ -4845,14 +4851,14 @@
           </p:sp>
         </mc:Fallback>
       </mc:AlternateContent>
-      <mc:AlternateContent xmlns:mc="http://schemas.openxmlformats.org/markup-compatibility/2006">
-        <mc:Choice xmlns:a14="http://schemas.microsoft.com/office/drawing/2010/main" Requires="a14">
+      <mc:AlternateContent xmlns:mc="http://schemas.openxmlformats.org/markup-compatibility/2006" xmlns:a14="http://schemas.microsoft.com/office/drawing/2010/main">
+        <mc:Choice Requires="a14">
           <p:sp>
             <p:nvSpPr>
               <p:cNvPr id="65" name="pole tekstowe 64">
                 <a:extLst>
                   <a:ext uri="{FF2B5EF4-FFF2-40B4-BE49-F238E27FC236}">
-                    <a16:creationId xmlns:a16="http://schemas.microsoft.com/office/drawing/2014/main" id="{80B0C4EA-321A-4DCE-BCB5-E8F4E7697857}"/>
+                    <a16:creationId xmlns:a16="http://schemas.microsoft.com/office/drawing/2014/main" xmlns="" id="{80B0C4EA-321A-4DCE-BCB5-E8F4E7697857}"/>
                   </a:ext>
                 </a:extLst>
               </p:cNvPr>
@@ -4875,6 +4881,7 @@
               </a:bodyPr>
               <a:lstStyle/>
               <a:p>
+                <a:pPr/>
                 <a14:m>
                   <m:oMathPara xmlns:m="http://schemas.openxmlformats.org/officeDocument/2006/math">
                     <m:oMathParaPr>
@@ -4885,7 +4892,7 @@
                         <m:sSubPr>
                           <m:ctrlPr>
                             <a:rPr lang="pl-PL" b="0" i="1" smtClean="0">
-                              <a:latin typeface="Cambria Math" panose="02040503050406030204" pitchFamily="18" charset="0"/>
+                              <a:latin typeface="Cambria Math"/>
                             </a:rPr>
                           </m:ctrlPr>
                         </m:sSubPr>
@@ -4914,7 +4921,7 @@
             </p:txBody>
           </p:sp>
         </mc:Choice>
-        <mc:Fallback>
+        <mc:Fallback xmlns="">
           <p:sp>
             <p:nvSpPr>
               <p:cNvPr id="65" name="pole tekstowe 64">
@@ -4959,14 +4966,14 @@
           </p:sp>
         </mc:Fallback>
       </mc:AlternateContent>
-      <mc:AlternateContent xmlns:mc="http://schemas.openxmlformats.org/markup-compatibility/2006">
-        <mc:Choice xmlns:a14="http://schemas.microsoft.com/office/drawing/2010/main" Requires="a14">
+      <mc:AlternateContent xmlns:mc="http://schemas.openxmlformats.org/markup-compatibility/2006" xmlns:a14="http://schemas.microsoft.com/office/drawing/2010/main">
+        <mc:Choice Requires="a14">
           <p:sp>
             <p:nvSpPr>
               <p:cNvPr id="66" name="pole tekstowe 65">
                 <a:extLst>
                   <a:ext uri="{FF2B5EF4-FFF2-40B4-BE49-F238E27FC236}">
-                    <a16:creationId xmlns:a16="http://schemas.microsoft.com/office/drawing/2014/main" id="{B83E1488-04C3-4CE3-A649-3487A700D4CE}"/>
+                    <a16:creationId xmlns:a16="http://schemas.microsoft.com/office/drawing/2014/main" xmlns="" id="{B83E1488-04C3-4CE3-A649-3487A700D4CE}"/>
                   </a:ext>
                 </a:extLst>
               </p:cNvPr>
@@ -4989,6 +4996,7 @@
               </a:bodyPr>
               <a:lstStyle/>
               <a:p>
+                <a:pPr/>
                 <a14:m>
                   <m:oMathPara xmlns:m="http://schemas.openxmlformats.org/officeDocument/2006/math">
                     <m:oMathParaPr>
@@ -4999,7 +5007,7 @@
                         <m:sSubPr>
                           <m:ctrlPr>
                             <a:rPr lang="pl-PL" b="0" i="1" smtClean="0">
-                              <a:latin typeface="Cambria Math" panose="02040503050406030204" pitchFamily="18" charset="0"/>
+                              <a:latin typeface="Cambria Math"/>
                             </a:rPr>
                           </m:ctrlPr>
                         </m:sSubPr>
@@ -5028,7 +5036,7 @@
             </p:txBody>
           </p:sp>
         </mc:Choice>
-        <mc:Fallback>
+        <mc:Fallback xmlns="">
           <p:sp>
             <p:nvSpPr>
               <p:cNvPr id="66" name="pole tekstowe 65">
@@ -5073,14 +5081,14 @@
           </p:sp>
         </mc:Fallback>
       </mc:AlternateContent>
-      <mc:AlternateContent xmlns:mc="http://schemas.openxmlformats.org/markup-compatibility/2006">
-        <mc:Choice xmlns:a14="http://schemas.microsoft.com/office/drawing/2010/main" Requires="a14">
+      <mc:AlternateContent xmlns:mc="http://schemas.openxmlformats.org/markup-compatibility/2006" xmlns:a14="http://schemas.microsoft.com/office/drawing/2010/main">
+        <mc:Choice Requires="a14">
           <p:sp>
             <p:nvSpPr>
               <p:cNvPr id="68" name="pole tekstowe 67">
                 <a:extLst>
                   <a:ext uri="{FF2B5EF4-FFF2-40B4-BE49-F238E27FC236}">
-                    <a16:creationId xmlns:a16="http://schemas.microsoft.com/office/drawing/2014/main" id="{5FA48E2B-B671-4EBC-BAB4-7C7434B3AD05}"/>
+                    <a16:creationId xmlns:a16="http://schemas.microsoft.com/office/drawing/2014/main" xmlns="" id="{5FA48E2B-B671-4EBC-BAB4-7C7434B3AD05}"/>
                   </a:ext>
                 </a:extLst>
               </p:cNvPr>
@@ -5103,6 +5111,7 @@
               </a:bodyPr>
               <a:lstStyle/>
               <a:p>
+                <a:pPr/>
                 <a14:m>
                   <m:oMathPara xmlns:m="http://schemas.openxmlformats.org/officeDocument/2006/math">
                     <m:oMathParaPr>
@@ -5113,7 +5122,7 @@
                         <m:sSubPr>
                           <m:ctrlPr>
                             <a:rPr lang="pl-PL" b="0" i="1" smtClean="0">
-                              <a:latin typeface="Cambria Math" panose="02040503050406030204" pitchFamily="18" charset="0"/>
+                              <a:latin typeface="Cambria Math"/>
                             </a:rPr>
                           </m:ctrlPr>
                         </m:sSubPr>
@@ -5142,7 +5151,7 @@
             </p:txBody>
           </p:sp>
         </mc:Choice>
-        <mc:Fallback>
+        <mc:Fallback xmlns="">
           <p:sp>
             <p:nvSpPr>
               <p:cNvPr id="68" name="pole tekstowe 67">
@@ -5187,14 +5196,14 @@
           </p:sp>
         </mc:Fallback>
       </mc:AlternateContent>
-      <mc:AlternateContent xmlns:mc="http://schemas.openxmlformats.org/markup-compatibility/2006">
-        <mc:Choice xmlns:a14="http://schemas.microsoft.com/office/drawing/2010/main" Requires="a14">
+      <mc:AlternateContent xmlns:mc="http://schemas.openxmlformats.org/markup-compatibility/2006" xmlns:a14="http://schemas.microsoft.com/office/drawing/2010/main">
+        <mc:Choice Requires="a14">
           <p:sp>
             <p:nvSpPr>
               <p:cNvPr id="69" name="pole tekstowe 68">
                 <a:extLst>
                   <a:ext uri="{FF2B5EF4-FFF2-40B4-BE49-F238E27FC236}">
-                    <a16:creationId xmlns:a16="http://schemas.microsoft.com/office/drawing/2014/main" id="{1A605648-7854-46C8-9A22-F575048C3184}"/>
+                    <a16:creationId xmlns:a16="http://schemas.microsoft.com/office/drawing/2014/main" xmlns="" id="{1A605648-7854-46C8-9A22-F575048C3184}"/>
                   </a:ext>
                 </a:extLst>
               </p:cNvPr>
@@ -5217,6 +5226,7 @@
               </a:bodyPr>
               <a:lstStyle/>
               <a:p>
+                <a:pPr/>
                 <a14:m>
                   <m:oMathPara xmlns:m="http://schemas.openxmlformats.org/officeDocument/2006/math">
                     <m:oMathParaPr>
@@ -5227,7 +5237,7 @@
                         <m:sSubPr>
                           <m:ctrlPr>
                             <a:rPr lang="pl-PL" b="0" i="1" smtClean="0">
-                              <a:latin typeface="Cambria Math" panose="02040503050406030204" pitchFamily="18" charset="0"/>
+                              <a:latin typeface="Cambria Math"/>
                             </a:rPr>
                           </m:ctrlPr>
                         </m:sSubPr>
@@ -5256,7 +5266,7 @@
             </p:txBody>
           </p:sp>
         </mc:Choice>
-        <mc:Fallback>
+        <mc:Fallback xmlns="">
           <p:sp>
             <p:nvSpPr>
               <p:cNvPr id="69" name="pole tekstowe 68">
@@ -5301,14 +5311,14 @@
           </p:sp>
         </mc:Fallback>
       </mc:AlternateContent>
-      <mc:AlternateContent xmlns:mc="http://schemas.openxmlformats.org/markup-compatibility/2006">
-        <mc:Choice xmlns:a14="http://schemas.microsoft.com/office/drawing/2010/main" Requires="a14">
+      <mc:AlternateContent xmlns:mc="http://schemas.openxmlformats.org/markup-compatibility/2006" xmlns:a14="http://schemas.microsoft.com/office/drawing/2010/main">
+        <mc:Choice Requires="a14">
           <p:sp>
             <p:nvSpPr>
               <p:cNvPr id="70" name="pole tekstowe 69">
                 <a:extLst>
                   <a:ext uri="{FF2B5EF4-FFF2-40B4-BE49-F238E27FC236}">
-                    <a16:creationId xmlns:a16="http://schemas.microsoft.com/office/drawing/2014/main" id="{8D795676-59C0-40D9-91B2-731DA2CBDEF5}"/>
+                    <a16:creationId xmlns:a16="http://schemas.microsoft.com/office/drawing/2014/main" xmlns="" id="{8D795676-59C0-40D9-91B2-731DA2CBDEF5}"/>
                   </a:ext>
                 </a:extLst>
               </p:cNvPr>
@@ -5331,6 +5341,7 @@
               </a:bodyPr>
               <a:lstStyle/>
               <a:p>
+                <a:pPr/>
                 <a14:m>
                   <m:oMathPara xmlns:m="http://schemas.openxmlformats.org/officeDocument/2006/math">
                     <m:oMathParaPr>
@@ -5341,7 +5352,7 @@
                         <m:sSubPr>
                           <m:ctrlPr>
                             <a:rPr lang="pl-PL" b="0" i="1" smtClean="0">
-                              <a:latin typeface="Cambria Math" panose="02040503050406030204" pitchFamily="18" charset="0"/>
+                              <a:latin typeface="Cambria Math"/>
                             </a:rPr>
                           </m:ctrlPr>
                         </m:sSubPr>
@@ -5370,7 +5381,7 @@
             </p:txBody>
           </p:sp>
         </mc:Choice>
-        <mc:Fallback>
+        <mc:Fallback xmlns="">
           <p:sp>
             <p:nvSpPr>
               <p:cNvPr id="70" name="pole tekstowe 69">
@@ -5415,14 +5426,14 @@
           </p:sp>
         </mc:Fallback>
       </mc:AlternateContent>
-      <mc:AlternateContent xmlns:mc="http://schemas.openxmlformats.org/markup-compatibility/2006">
-        <mc:Choice xmlns:a14="http://schemas.microsoft.com/office/drawing/2010/main" Requires="a14">
+      <mc:AlternateContent xmlns:mc="http://schemas.openxmlformats.org/markup-compatibility/2006" xmlns:a14="http://schemas.microsoft.com/office/drawing/2010/main">
+        <mc:Choice Requires="a14">
           <p:sp>
             <p:nvSpPr>
               <p:cNvPr id="71" name="pole tekstowe 70">
                 <a:extLst>
                   <a:ext uri="{FF2B5EF4-FFF2-40B4-BE49-F238E27FC236}">
-                    <a16:creationId xmlns:a16="http://schemas.microsoft.com/office/drawing/2014/main" id="{1A2269DA-8073-47D7-913E-7B5DE84B117D}"/>
+                    <a16:creationId xmlns:a16="http://schemas.microsoft.com/office/drawing/2014/main" xmlns="" id="{1A2269DA-8073-47D7-913E-7B5DE84B117D}"/>
                   </a:ext>
                 </a:extLst>
               </p:cNvPr>
@@ -5445,6 +5456,7 @@
               </a:bodyPr>
               <a:lstStyle/>
               <a:p>
+                <a:pPr/>
                 <a14:m>
                   <m:oMathPara xmlns:m="http://schemas.openxmlformats.org/officeDocument/2006/math">
                     <m:oMathParaPr>
@@ -5455,7 +5467,7 @@
                         <m:sSubPr>
                           <m:ctrlPr>
                             <a:rPr lang="pl-PL" b="0" i="1" smtClean="0">
-                              <a:latin typeface="Cambria Math" panose="02040503050406030204" pitchFamily="18" charset="0"/>
+                              <a:latin typeface="Cambria Math"/>
                             </a:rPr>
                           </m:ctrlPr>
                         </m:sSubPr>
@@ -5484,7 +5496,7 @@
             </p:txBody>
           </p:sp>
         </mc:Choice>
-        <mc:Fallback>
+        <mc:Fallback xmlns="">
           <p:sp>
             <p:nvSpPr>
               <p:cNvPr id="71" name="pole tekstowe 70">
@@ -5529,14 +5541,14 @@
           </p:sp>
         </mc:Fallback>
       </mc:AlternateContent>
-      <mc:AlternateContent xmlns:mc="http://schemas.openxmlformats.org/markup-compatibility/2006">
-        <mc:Choice xmlns:a14="http://schemas.microsoft.com/office/drawing/2010/main" Requires="a14">
+      <mc:AlternateContent xmlns:mc="http://schemas.openxmlformats.org/markup-compatibility/2006" xmlns:a14="http://schemas.microsoft.com/office/drawing/2010/main">
+        <mc:Choice Requires="a14">
           <p:sp>
             <p:nvSpPr>
               <p:cNvPr id="72" name="pole tekstowe 71">
                 <a:extLst>
                   <a:ext uri="{FF2B5EF4-FFF2-40B4-BE49-F238E27FC236}">
-                    <a16:creationId xmlns:a16="http://schemas.microsoft.com/office/drawing/2014/main" id="{313C50FE-0034-4ED4-9DE3-EDE4B957E9C7}"/>
+                    <a16:creationId xmlns:a16="http://schemas.microsoft.com/office/drawing/2014/main" xmlns="" id="{313C50FE-0034-4ED4-9DE3-EDE4B957E9C7}"/>
                   </a:ext>
                 </a:extLst>
               </p:cNvPr>
@@ -5559,6 +5571,7 @@
               </a:bodyPr>
               <a:lstStyle/>
               <a:p>
+                <a:pPr/>
                 <a14:m>
                   <m:oMathPara xmlns:m="http://schemas.openxmlformats.org/officeDocument/2006/math">
                     <m:oMathParaPr>
@@ -5569,7 +5582,7 @@
                         <m:sSubPr>
                           <m:ctrlPr>
                             <a:rPr lang="pl-PL" b="0" i="1" smtClean="0">
-                              <a:latin typeface="Cambria Math" panose="02040503050406030204" pitchFamily="18" charset="0"/>
+                              <a:latin typeface="Cambria Math"/>
                             </a:rPr>
                           </m:ctrlPr>
                         </m:sSubPr>
@@ -5598,7 +5611,7 @@
             </p:txBody>
           </p:sp>
         </mc:Choice>
-        <mc:Fallback>
+        <mc:Fallback xmlns="">
           <p:sp>
             <p:nvSpPr>
               <p:cNvPr id="72" name="pole tekstowe 71">
@@ -5643,14 +5656,14 @@
           </p:sp>
         </mc:Fallback>
       </mc:AlternateContent>
-      <mc:AlternateContent xmlns:mc="http://schemas.openxmlformats.org/markup-compatibility/2006">
-        <mc:Choice xmlns:a14="http://schemas.microsoft.com/office/drawing/2010/main" Requires="a14">
+      <mc:AlternateContent xmlns:mc="http://schemas.openxmlformats.org/markup-compatibility/2006" xmlns:a14="http://schemas.microsoft.com/office/drawing/2010/main">
+        <mc:Choice Requires="a14">
           <p:sp>
             <p:nvSpPr>
               <p:cNvPr id="73" name="pole tekstowe 72">
                 <a:extLst>
                   <a:ext uri="{FF2B5EF4-FFF2-40B4-BE49-F238E27FC236}">
-                    <a16:creationId xmlns:a16="http://schemas.microsoft.com/office/drawing/2014/main" id="{56E98669-6C23-4727-9DA1-47813C52EC16}"/>
+                    <a16:creationId xmlns:a16="http://schemas.microsoft.com/office/drawing/2014/main" xmlns="" id="{56E98669-6C23-4727-9DA1-47813C52EC16}"/>
                   </a:ext>
                 </a:extLst>
               </p:cNvPr>
@@ -5673,6 +5686,7 @@
               </a:bodyPr>
               <a:lstStyle/>
               <a:p>
+                <a:pPr/>
                 <a14:m>
                   <m:oMathPara xmlns:m="http://schemas.openxmlformats.org/officeDocument/2006/math">
                     <m:oMathParaPr>
@@ -5683,7 +5697,7 @@
                         <m:sSubPr>
                           <m:ctrlPr>
                             <a:rPr lang="pl-PL" b="0" i="1" smtClean="0">
-                              <a:latin typeface="Cambria Math" panose="02040503050406030204" pitchFamily="18" charset="0"/>
+                              <a:latin typeface="Cambria Math"/>
                             </a:rPr>
                           </m:ctrlPr>
                         </m:sSubPr>
@@ -5712,7 +5726,7 @@
             </p:txBody>
           </p:sp>
         </mc:Choice>
-        <mc:Fallback>
+        <mc:Fallback xmlns="">
           <p:sp>
             <p:nvSpPr>
               <p:cNvPr id="73" name="pole tekstowe 72">
@@ -5757,14 +5771,14 @@
           </p:sp>
         </mc:Fallback>
       </mc:AlternateContent>
-      <mc:AlternateContent xmlns:mc="http://schemas.openxmlformats.org/markup-compatibility/2006">
-        <mc:Choice xmlns:a14="http://schemas.microsoft.com/office/drawing/2010/main" Requires="a14">
+      <mc:AlternateContent xmlns:mc="http://schemas.openxmlformats.org/markup-compatibility/2006" xmlns:a14="http://schemas.microsoft.com/office/drawing/2010/main">
+        <mc:Choice Requires="a14">
           <p:sp>
             <p:nvSpPr>
               <p:cNvPr id="74" name="pole tekstowe 73">
                 <a:extLst>
                   <a:ext uri="{FF2B5EF4-FFF2-40B4-BE49-F238E27FC236}">
-                    <a16:creationId xmlns:a16="http://schemas.microsoft.com/office/drawing/2014/main" id="{7A1CD9F8-2E20-465F-B7AC-23DFCA80F73E}"/>
+                    <a16:creationId xmlns:a16="http://schemas.microsoft.com/office/drawing/2014/main" xmlns="" id="{7A1CD9F8-2E20-465F-B7AC-23DFCA80F73E}"/>
                   </a:ext>
                 </a:extLst>
               </p:cNvPr>
@@ -5787,6 +5801,7 @@
               </a:bodyPr>
               <a:lstStyle/>
               <a:p>
+                <a:pPr/>
                 <a14:m>
                   <m:oMathPara xmlns:m="http://schemas.openxmlformats.org/officeDocument/2006/math">
                     <m:oMathParaPr>
@@ -5797,7 +5812,7 @@
                         <m:sSubPr>
                           <m:ctrlPr>
                             <a:rPr lang="pl-PL" b="0" i="1" smtClean="0">
-                              <a:latin typeface="Cambria Math" panose="02040503050406030204" pitchFamily="18" charset="0"/>
+                              <a:latin typeface="Cambria Math"/>
                             </a:rPr>
                           </m:ctrlPr>
                         </m:sSubPr>
@@ -5826,7 +5841,7 @@
             </p:txBody>
           </p:sp>
         </mc:Choice>
-        <mc:Fallback>
+        <mc:Fallback xmlns="">
           <p:sp>
             <p:nvSpPr>
               <p:cNvPr id="74" name="pole tekstowe 73">
@@ -5871,14 +5886,14 @@
           </p:sp>
         </mc:Fallback>
       </mc:AlternateContent>
-      <mc:AlternateContent xmlns:mc="http://schemas.openxmlformats.org/markup-compatibility/2006">
-        <mc:Choice xmlns:a14="http://schemas.microsoft.com/office/drawing/2010/main" Requires="a14">
+      <mc:AlternateContent xmlns:mc="http://schemas.openxmlformats.org/markup-compatibility/2006" xmlns:a14="http://schemas.microsoft.com/office/drawing/2010/main">
+        <mc:Choice Requires="a14">
           <p:sp>
             <p:nvSpPr>
               <p:cNvPr id="75" name="pole tekstowe 74">
                 <a:extLst>
                   <a:ext uri="{FF2B5EF4-FFF2-40B4-BE49-F238E27FC236}">
-                    <a16:creationId xmlns:a16="http://schemas.microsoft.com/office/drawing/2014/main" id="{D0C93558-E709-484C-9CFD-D8502AB85CF1}"/>
+                    <a16:creationId xmlns:a16="http://schemas.microsoft.com/office/drawing/2014/main" xmlns="" id="{D0C93558-E709-484C-9CFD-D8502AB85CF1}"/>
                   </a:ext>
                 </a:extLst>
               </p:cNvPr>
@@ -5901,6 +5916,7 @@
               </a:bodyPr>
               <a:lstStyle/>
               <a:p>
+                <a:pPr/>
                 <a14:m>
                   <m:oMathPara xmlns:m="http://schemas.openxmlformats.org/officeDocument/2006/math">
                     <m:oMathParaPr>
@@ -5911,7 +5927,7 @@
                         <m:sSubPr>
                           <m:ctrlPr>
                             <a:rPr lang="pl-PL" b="0" i="1" smtClean="0">
-                              <a:latin typeface="Cambria Math" panose="02040503050406030204" pitchFamily="18" charset="0"/>
+                              <a:latin typeface="Cambria Math"/>
                             </a:rPr>
                           </m:ctrlPr>
                         </m:sSubPr>
@@ -5940,7 +5956,7 @@
             </p:txBody>
           </p:sp>
         </mc:Choice>
-        <mc:Fallback>
+        <mc:Fallback xmlns="">
           <p:sp>
             <p:nvSpPr>
               <p:cNvPr id="75" name="pole tekstowe 74">
@@ -5990,7 +6006,7 @@
           <p:cNvPr id="76" name="Obraz 75">
             <a:extLst>
               <a:ext uri="{FF2B5EF4-FFF2-40B4-BE49-F238E27FC236}">
-                <a16:creationId xmlns:a16="http://schemas.microsoft.com/office/drawing/2014/main" id="{90C01124-019F-4677-BDAA-CB18543057B5}"/>
+                <a16:creationId xmlns:a16="http://schemas.microsoft.com/office/drawing/2014/main" xmlns="" id="{90C01124-019F-4677-BDAA-CB18543057B5}"/>
               </a:ext>
             </a:extLst>
           </p:cNvPr>
@@ -6020,7 +6036,7 @@
           <p:cNvPr id="80" name="Obraz 79">
             <a:extLst>
               <a:ext uri="{FF2B5EF4-FFF2-40B4-BE49-F238E27FC236}">
-                <a16:creationId xmlns:a16="http://schemas.microsoft.com/office/drawing/2014/main" id="{3371E5BE-4199-4964-A423-94229B0D3166}"/>
+                <a16:creationId xmlns:a16="http://schemas.microsoft.com/office/drawing/2014/main" xmlns="" id="{3371E5BE-4199-4964-A423-94229B0D3166}"/>
               </a:ext>
             </a:extLst>
           </p:cNvPr>
@@ -6050,7 +6066,7 @@
           <p:cNvPr id="81" name="Obraz 80">
             <a:extLst>
               <a:ext uri="{FF2B5EF4-FFF2-40B4-BE49-F238E27FC236}">
-                <a16:creationId xmlns:a16="http://schemas.microsoft.com/office/drawing/2014/main" id="{6938E0B8-84B1-4232-9144-E577AC5A1825}"/>
+                <a16:creationId xmlns:a16="http://schemas.microsoft.com/office/drawing/2014/main" xmlns="" id="{6938E0B8-84B1-4232-9144-E577AC5A1825}"/>
               </a:ext>
             </a:extLst>
           </p:cNvPr>
@@ -6079,6 +6095,1282 @@
     <p:extLst>
       <p:ext uri="{BB962C8B-B14F-4D97-AF65-F5344CB8AC3E}">
         <p14:creationId xmlns:p14="http://schemas.microsoft.com/office/powerpoint/2010/main" val="3188984685"/>
+      </p:ext>
+    </p:extLst>
+  </p:cSld>
+  <p:clrMapOvr>
+    <a:masterClrMapping/>
+  </p:clrMapOvr>
+</p:sld>
+</file>
+
+<file path=ppt/slides/slide2.xml><?xml version="1.0" encoding="utf-8"?>
+<p:sld xmlns:a="http://schemas.openxmlformats.org/drawingml/2006/main" xmlns:r="http://schemas.openxmlformats.org/officeDocument/2006/relationships" xmlns:p="http://schemas.openxmlformats.org/presentationml/2006/main">
+  <p:cSld>
+    <p:spTree>
+      <p:nvGrpSpPr>
+        <p:cNvPr id="1" name=""/>
+        <p:cNvGrpSpPr/>
+        <p:nvPr/>
+      </p:nvGrpSpPr>
+      <p:grpSpPr>
+        <a:xfrm>
+          <a:off x="0" y="0"/>
+          <a:ext cx="0" cy="0"/>
+          <a:chOff x="0" y="0"/>
+          <a:chExt cx="0" cy="0"/>
+        </a:xfrm>
+      </p:grpSpPr>
+      <p:cxnSp>
+        <p:nvCxnSpPr>
+          <p:cNvPr id="4" name="Łącznik prosty 51">
+            <a:extLst>
+              <a:ext uri="{FF2B5EF4-FFF2-40B4-BE49-F238E27FC236}">
+                <a16:creationId xmlns:a16="http://schemas.microsoft.com/office/drawing/2014/main" xmlns="" id="{74A27586-AD5E-47C5-865B-63A569962038}"/>
+              </a:ext>
+            </a:extLst>
+          </p:cNvPr>
+          <p:cNvCxnSpPr>
+            <a:cxnSpLocks/>
+          </p:cNvCxnSpPr>
+          <p:nvPr/>
+        </p:nvCxnSpPr>
+        <p:spPr>
+          <a:xfrm flipV="1">
+            <a:off x="3255285" y="2559337"/>
+            <a:ext cx="6293960" cy="10631"/>
+          </a:xfrm>
+          <a:prstGeom prst="line">
+            <a:avLst/>
+          </a:prstGeom>
+          <a:ln w="19050">
+            <a:solidFill>
+              <a:schemeClr val="tx1"/>
+            </a:solidFill>
+          </a:ln>
+        </p:spPr>
+        <p:style>
+          <a:lnRef idx="1">
+            <a:schemeClr val="accent1"/>
+          </a:lnRef>
+          <a:fillRef idx="0">
+            <a:schemeClr val="accent1"/>
+          </a:fillRef>
+          <a:effectRef idx="0">
+            <a:schemeClr val="accent1"/>
+          </a:effectRef>
+          <a:fontRef idx="minor">
+            <a:schemeClr val="tx1"/>
+          </a:fontRef>
+        </p:style>
+      </p:cxnSp>
+      <p:cxnSp>
+        <p:nvCxnSpPr>
+          <p:cNvPr id="5" name="Łącznik prosty 52">
+            <a:extLst>
+              <a:ext uri="{FF2B5EF4-FFF2-40B4-BE49-F238E27FC236}">
+                <a16:creationId xmlns:a16="http://schemas.microsoft.com/office/drawing/2014/main" xmlns="" id="{44262F17-59F3-4C2D-971D-AD224677CC33}"/>
+              </a:ext>
+            </a:extLst>
+          </p:cNvPr>
+          <p:cNvCxnSpPr>
+            <a:cxnSpLocks/>
+          </p:cNvCxnSpPr>
+          <p:nvPr/>
+        </p:nvCxnSpPr>
+        <p:spPr>
+          <a:xfrm rot="-1020000" flipV="1">
+            <a:off x="3220938" y="2457962"/>
+            <a:ext cx="68690" cy="219257"/>
+          </a:xfrm>
+          <a:prstGeom prst="line">
+            <a:avLst/>
+          </a:prstGeom>
+          <a:ln w="19050">
+            <a:solidFill>
+              <a:schemeClr val="tx1"/>
+            </a:solidFill>
+          </a:ln>
+        </p:spPr>
+        <p:style>
+          <a:lnRef idx="1">
+            <a:schemeClr val="accent1"/>
+          </a:lnRef>
+          <a:fillRef idx="0">
+            <a:schemeClr val="accent1"/>
+          </a:fillRef>
+          <a:effectRef idx="0">
+            <a:schemeClr val="accent1"/>
+          </a:effectRef>
+          <a:fontRef idx="minor">
+            <a:schemeClr val="tx1"/>
+          </a:fontRef>
+        </p:style>
+      </p:cxnSp>
+      <p:cxnSp>
+        <p:nvCxnSpPr>
+          <p:cNvPr id="7" name="Łącznik prosty 55">
+            <a:extLst>
+              <a:ext uri="{FF2B5EF4-FFF2-40B4-BE49-F238E27FC236}">
+                <a16:creationId xmlns:a16="http://schemas.microsoft.com/office/drawing/2014/main" xmlns="" id="{F6606FD7-7388-4391-A2B8-EC4A47EF52E8}"/>
+              </a:ext>
+            </a:extLst>
+          </p:cNvPr>
+          <p:cNvCxnSpPr>
+            <a:cxnSpLocks/>
+          </p:cNvCxnSpPr>
+          <p:nvPr/>
+        </p:nvCxnSpPr>
+        <p:spPr>
+          <a:xfrm rot="-1020000" flipV="1">
+            <a:off x="4460886" y="2450025"/>
+            <a:ext cx="68690" cy="219257"/>
+          </a:xfrm>
+          <a:prstGeom prst="line">
+            <a:avLst/>
+          </a:prstGeom>
+          <a:ln w="19050">
+            <a:solidFill>
+              <a:schemeClr val="tx1"/>
+            </a:solidFill>
+          </a:ln>
+        </p:spPr>
+        <p:style>
+          <a:lnRef idx="1">
+            <a:schemeClr val="accent1"/>
+          </a:lnRef>
+          <a:fillRef idx="0">
+            <a:schemeClr val="accent1"/>
+          </a:fillRef>
+          <a:effectRef idx="0">
+            <a:schemeClr val="accent1"/>
+          </a:effectRef>
+          <a:fontRef idx="minor">
+            <a:schemeClr val="tx1"/>
+          </a:fontRef>
+        </p:style>
+      </p:cxnSp>
+      <p:cxnSp>
+        <p:nvCxnSpPr>
+          <p:cNvPr id="9" name="Łącznik prosty 57">
+            <a:extLst>
+              <a:ext uri="{FF2B5EF4-FFF2-40B4-BE49-F238E27FC236}">
+                <a16:creationId xmlns:a16="http://schemas.microsoft.com/office/drawing/2014/main" xmlns="" id="{AF67675A-019A-40D8-A9BF-B6E2D2AB3233}"/>
+              </a:ext>
+            </a:extLst>
+          </p:cNvPr>
+          <p:cNvCxnSpPr>
+            <a:cxnSpLocks/>
+          </p:cNvCxnSpPr>
+          <p:nvPr/>
+        </p:nvCxnSpPr>
+        <p:spPr>
+          <a:xfrm rot="-1020000" flipV="1">
+            <a:off x="5756172" y="2449711"/>
+            <a:ext cx="68690" cy="219257"/>
+          </a:xfrm>
+          <a:prstGeom prst="line">
+            <a:avLst/>
+          </a:prstGeom>
+          <a:ln w="19050">
+            <a:solidFill>
+              <a:schemeClr val="tx1"/>
+            </a:solidFill>
+          </a:ln>
+        </p:spPr>
+        <p:style>
+          <a:lnRef idx="1">
+            <a:schemeClr val="accent1"/>
+          </a:lnRef>
+          <a:fillRef idx="0">
+            <a:schemeClr val="accent1"/>
+          </a:fillRef>
+          <a:effectRef idx="0">
+            <a:schemeClr val="accent1"/>
+          </a:effectRef>
+          <a:fontRef idx="minor">
+            <a:schemeClr val="tx1"/>
+          </a:fontRef>
+        </p:style>
+      </p:cxnSp>
+      <mc:AlternateContent xmlns:mc="http://schemas.openxmlformats.org/markup-compatibility/2006">
+        <mc:Choice xmlns:a14="http://schemas.microsoft.com/office/drawing/2010/main" Requires="a14">
+          <p:sp>
+            <p:nvSpPr>
+              <p:cNvPr id="11" name="pole tekstowe 70">
+                <a:extLst>
+                  <a:ext uri="{FF2B5EF4-FFF2-40B4-BE49-F238E27FC236}">
+                    <a16:creationId xmlns:a16="http://schemas.microsoft.com/office/drawing/2014/main" xmlns="" id="{1A2269DA-8073-47D7-913E-7B5DE84B117D}"/>
+                  </a:ext>
+                </a:extLst>
+              </p:cNvPr>
+              <p:cNvSpPr txBox="1"/>
+              <p:nvPr/>
+            </p:nvSpPr>
+            <p:spPr>
+              <a:xfrm>
+                <a:off x="3736278" y="1736572"/>
+                <a:ext cx="277961" cy="276999"/>
+              </a:xfrm>
+              <a:prstGeom prst="rect">
+                <a:avLst/>
+              </a:prstGeom>
+              <a:noFill/>
+            </p:spPr>
+            <p:txBody>
+              <a:bodyPr wrap="none" lIns="0" tIns="0" rIns="0" bIns="0" rtlCol="0">
+                <a:spAutoFit/>
+              </a:bodyPr>
+              <a:lstStyle/>
+              <a:p>
+                <a:pPr/>
+                <a14:m>
+                  <m:oMathPara xmlns:m="http://schemas.openxmlformats.org/officeDocument/2006/math">
+                    <m:oMathParaPr>
+                      <m:jc m:val="centerGroup"/>
+                    </m:oMathParaPr>
+                    <m:oMath xmlns:m="http://schemas.openxmlformats.org/officeDocument/2006/math">
+                      <m:sSub>
+                        <m:sSubPr>
+                          <m:ctrlPr>
+                            <a:rPr lang="pl-PL" b="0" i="1" smtClean="0">
+                              <a:latin typeface="Cambria Math"/>
+                            </a:rPr>
+                          </m:ctrlPr>
+                        </m:sSubPr>
+                        <m:e>
+                          <m:r>
+                            <a:rPr lang="pl-PL" b="0" i="1" smtClean="0">
+                              <a:latin typeface="Cambria Math"/>
+                            </a:rPr>
+                            <m:t>𝑏</m:t>
+                          </m:r>
+                        </m:e>
+                        <m:sub>
+                          <m:r>
+                            <a:rPr lang="pl-PL" b="0" i="1" smtClean="0">
+                              <a:latin typeface="Cambria Math" panose="02040503050406030204" pitchFamily="18" charset="0"/>
+                            </a:rPr>
+                            <m:t>0</m:t>
+                          </m:r>
+                        </m:sub>
+                      </m:sSub>
+                    </m:oMath>
+                  </m:oMathPara>
+                </a14:m>
+                <a:endParaRPr lang="pl-PL" dirty="0"/>
+              </a:p>
+            </p:txBody>
+          </p:sp>
+        </mc:Choice>
+        <mc:Fallback>
+          <p:sp>
+            <p:nvSpPr>
+              <p:cNvPr id="11" name="pole tekstowe 70">
+                <a:extLst>
+                  <a:ext uri="{FF2B5EF4-FFF2-40B4-BE49-F238E27FC236}">
+                    <a16:creationId xmlns:a16="http://schemas.microsoft.com/office/drawing/2014/main" xmlns:a14="http://schemas.microsoft.com/office/drawing/2010/main" xmlns="" id="{1A2269DA-8073-47D7-913E-7B5DE84B117D}"/>
+                  </a:ext>
+                </a:extLst>
+              </p:cNvPr>
+              <p:cNvSpPr txBox="1">
+                <a:spLocks noRot="1" noChangeAspect="1" noMove="1" noResize="1" noEditPoints="1" noAdjustHandles="1" noChangeArrowheads="1" noChangeShapeType="1" noTextEdit="1"/>
+              </p:cNvSpPr>
+              <p:nvPr/>
+            </p:nvSpPr>
+            <p:spPr>
+              <a:xfrm>
+                <a:off x="3736278" y="1736572"/>
+                <a:ext cx="277961" cy="276999"/>
+              </a:xfrm>
+              <a:prstGeom prst="rect">
+                <a:avLst/>
+              </a:prstGeom>
+              <a:blipFill rotWithShape="1">
+                <a:blip r:embed="rId2"/>
+                <a:stretch>
+                  <a:fillRect l="-19565" r="-6522" b="-15556"/>
+                </a:stretch>
+              </a:blipFill>
+            </p:spPr>
+            <p:txBody>
+              <a:bodyPr/>
+              <a:lstStyle/>
+              <a:p>
+                <a:r>
+                  <a:rPr lang="pl-PL">
+                    <a:noFill/>
+                  </a:rPr>
+                  <a:t> </a:t>
+                </a:r>
+              </a:p>
+            </p:txBody>
+          </p:sp>
+        </mc:Fallback>
+      </mc:AlternateContent>
+      <mc:AlternateContent xmlns:mc="http://schemas.openxmlformats.org/markup-compatibility/2006">
+        <mc:Choice xmlns:a14="http://schemas.microsoft.com/office/drawing/2010/main" Requires="a14">
+          <p:sp>
+            <p:nvSpPr>
+              <p:cNvPr id="13" name="pole tekstowe 72">
+                <a:extLst>
+                  <a:ext uri="{FF2B5EF4-FFF2-40B4-BE49-F238E27FC236}">
+                    <a16:creationId xmlns:a16="http://schemas.microsoft.com/office/drawing/2014/main" xmlns="" id="{56E98669-6C23-4727-9DA1-47813C52EC16}"/>
+                  </a:ext>
+                </a:extLst>
+              </p:cNvPr>
+              <p:cNvSpPr txBox="1"/>
+              <p:nvPr/>
+            </p:nvSpPr>
+            <p:spPr>
+              <a:xfrm>
+                <a:off x="5019263" y="1721184"/>
+                <a:ext cx="272639" cy="276999"/>
+              </a:xfrm>
+              <a:prstGeom prst="rect">
+                <a:avLst/>
+              </a:prstGeom>
+              <a:noFill/>
+            </p:spPr>
+            <p:txBody>
+              <a:bodyPr wrap="none" lIns="0" tIns="0" rIns="0" bIns="0" rtlCol="0">
+                <a:spAutoFit/>
+              </a:bodyPr>
+              <a:lstStyle/>
+              <a:p>
+                <a:pPr/>
+                <a14:m>
+                  <m:oMathPara xmlns:m="http://schemas.openxmlformats.org/officeDocument/2006/math">
+                    <m:oMathParaPr>
+                      <m:jc m:val="centerGroup"/>
+                    </m:oMathParaPr>
+                    <m:oMath xmlns:m="http://schemas.openxmlformats.org/officeDocument/2006/math">
+                      <m:sSub>
+                        <m:sSubPr>
+                          <m:ctrlPr>
+                            <a:rPr lang="pl-PL" b="0" i="1" smtClean="0">
+                              <a:latin typeface="Cambria Math"/>
+                            </a:rPr>
+                          </m:ctrlPr>
+                        </m:sSubPr>
+                        <m:e>
+                          <m:r>
+                            <a:rPr lang="pl-PL" b="0" i="1" smtClean="0">
+                              <a:latin typeface="Cambria Math"/>
+                            </a:rPr>
+                            <m:t>𝑏</m:t>
+                          </m:r>
+                        </m:e>
+                        <m:sub>
+                          <m:r>
+                            <a:rPr lang="pl-PL" b="0" i="1" smtClean="0">
+                              <a:latin typeface="Cambria Math"/>
+                            </a:rPr>
+                            <m:t>1</m:t>
+                          </m:r>
+                        </m:sub>
+                      </m:sSub>
+                    </m:oMath>
+                  </m:oMathPara>
+                </a14:m>
+                <a:endParaRPr lang="pl-PL" dirty="0"/>
+              </a:p>
+            </p:txBody>
+          </p:sp>
+        </mc:Choice>
+        <mc:Fallback>
+          <p:sp>
+            <p:nvSpPr>
+              <p:cNvPr id="13" name="pole tekstowe 72">
+                <a:extLst>
+                  <a:ext uri="{FF2B5EF4-FFF2-40B4-BE49-F238E27FC236}">
+                    <a16:creationId xmlns:a16="http://schemas.microsoft.com/office/drawing/2014/main" xmlns:a14="http://schemas.microsoft.com/office/drawing/2010/main" xmlns="" id="{56E98669-6C23-4727-9DA1-47813C52EC16}"/>
+                  </a:ext>
+                </a:extLst>
+              </p:cNvPr>
+              <p:cNvSpPr txBox="1">
+                <a:spLocks noRot="1" noChangeAspect="1" noMove="1" noResize="1" noEditPoints="1" noAdjustHandles="1" noChangeArrowheads="1" noChangeShapeType="1" noTextEdit="1"/>
+              </p:cNvSpPr>
+              <p:nvPr/>
+            </p:nvSpPr>
+            <p:spPr>
+              <a:xfrm>
+                <a:off x="5019263" y="1721184"/>
+                <a:ext cx="272639" cy="276999"/>
+              </a:xfrm>
+              <a:prstGeom prst="rect">
+                <a:avLst/>
+              </a:prstGeom>
+              <a:blipFill rotWithShape="1">
+                <a:blip r:embed="rId3"/>
+                <a:stretch>
+                  <a:fillRect l="-20000" r="-6667" b="-15217"/>
+                </a:stretch>
+              </a:blipFill>
+            </p:spPr>
+            <p:txBody>
+              <a:bodyPr/>
+              <a:lstStyle/>
+              <a:p>
+                <a:r>
+                  <a:rPr lang="pl-PL">
+                    <a:noFill/>
+                  </a:rPr>
+                  <a:t> </a:t>
+                </a:r>
+              </a:p>
+            </p:txBody>
+          </p:sp>
+        </mc:Fallback>
+      </mc:AlternateContent>
+      <p:cxnSp>
+        <p:nvCxnSpPr>
+          <p:cNvPr id="17" name="Łącznik prosty 55">
+            <a:extLst>
+              <a:ext uri="{FF2B5EF4-FFF2-40B4-BE49-F238E27FC236}">
+                <a16:creationId xmlns:a16="http://schemas.microsoft.com/office/drawing/2014/main" xmlns="" id="{F6606FD7-7388-4391-A2B8-EC4A47EF52E8}"/>
+              </a:ext>
+            </a:extLst>
+          </p:cNvPr>
+          <p:cNvCxnSpPr>
+            <a:cxnSpLocks/>
+          </p:cNvCxnSpPr>
+          <p:nvPr/>
+        </p:nvCxnSpPr>
+        <p:spPr>
+          <a:xfrm rot="-1020000" flipV="1">
+            <a:off x="8219614" y="2463925"/>
+            <a:ext cx="68690" cy="219257"/>
+          </a:xfrm>
+          <a:prstGeom prst="line">
+            <a:avLst/>
+          </a:prstGeom>
+          <a:ln w="19050">
+            <a:solidFill>
+              <a:schemeClr val="tx1"/>
+            </a:solidFill>
+          </a:ln>
+        </p:spPr>
+        <p:style>
+          <a:lnRef idx="1">
+            <a:schemeClr val="accent1"/>
+          </a:lnRef>
+          <a:fillRef idx="0">
+            <a:schemeClr val="accent1"/>
+          </a:fillRef>
+          <a:effectRef idx="0">
+            <a:schemeClr val="accent1"/>
+          </a:effectRef>
+          <a:fontRef idx="minor">
+            <a:schemeClr val="tx1"/>
+          </a:fontRef>
+        </p:style>
+      </p:cxnSp>
+      <p:cxnSp>
+        <p:nvCxnSpPr>
+          <p:cNvPr id="18" name="Łącznik prosty 57">
+            <a:extLst>
+              <a:ext uri="{FF2B5EF4-FFF2-40B4-BE49-F238E27FC236}">
+                <a16:creationId xmlns:a16="http://schemas.microsoft.com/office/drawing/2014/main" xmlns="" id="{AF67675A-019A-40D8-A9BF-B6E2D2AB3233}"/>
+              </a:ext>
+            </a:extLst>
+          </p:cNvPr>
+          <p:cNvCxnSpPr>
+            <a:cxnSpLocks/>
+          </p:cNvCxnSpPr>
+          <p:nvPr/>
+        </p:nvCxnSpPr>
+        <p:spPr>
+          <a:xfrm rot="-1020000" flipV="1">
+            <a:off x="9514900" y="2463611"/>
+            <a:ext cx="68690" cy="219257"/>
+          </a:xfrm>
+          <a:prstGeom prst="line">
+            <a:avLst/>
+          </a:prstGeom>
+          <a:ln w="19050">
+            <a:solidFill>
+              <a:schemeClr val="tx1"/>
+            </a:solidFill>
+          </a:ln>
+        </p:spPr>
+        <p:style>
+          <a:lnRef idx="1">
+            <a:schemeClr val="accent1"/>
+          </a:lnRef>
+          <a:fillRef idx="0">
+            <a:schemeClr val="accent1"/>
+          </a:fillRef>
+          <a:effectRef idx="0">
+            <a:schemeClr val="accent1"/>
+          </a:effectRef>
+          <a:fontRef idx="minor">
+            <a:schemeClr val="tx1"/>
+          </a:fontRef>
+        </p:style>
+      </p:cxnSp>
+      <mc:AlternateContent xmlns:mc="http://schemas.openxmlformats.org/markup-compatibility/2006">
+        <mc:Choice xmlns:a14="http://schemas.microsoft.com/office/drawing/2010/main" Requires="a14">
+          <p:sp>
+            <p:nvSpPr>
+              <p:cNvPr id="19" name="pole tekstowe 72">
+                <a:extLst>
+                  <a:ext uri="{FF2B5EF4-FFF2-40B4-BE49-F238E27FC236}">
+                    <a16:creationId xmlns:a16="http://schemas.microsoft.com/office/drawing/2014/main" xmlns="" id="{56E98669-6C23-4727-9DA1-47813C52EC16}"/>
+                  </a:ext>
+                </a:extLst>
+              </p:cNvPr>
+              <p:cNvSpPr txBox="1"/>
+              <p:nvPr/>
+            </p:nvSpPr>
+            <p:spPr>
+              <a:xfrm>
+                <a:off x="8742251" y="1736572"/>
+                <a:ext cx="276038" cy="276999"/>
+              </a:xfrm>
+              <a:prstGeom prst="rect">
+                <a:avLst/>
+              </a:prstGeom>
+              <a:noFill/>
+            </p:spPr>
+            <p:txBody>
+              <a:bodyPr wrap="none" lIns="0" tIns="0" rIns="0" bIns="0" rtlCol="0">
+                <a:spAutoFit/>
+              </a:bodyPr>
+              <a:lstStyle/>
+              <a:p>
+                <a:pPr/>
+                <a14:m>
+                  <m:oMathPara xmlns:m="http://schemas.openxmlformats.org/officeDocument/2006/math">
+                    <m:oMathParaPr>
+                      <m:jc m:val="centerGroup"/>
+                    </m:oMathParaPr>
+                    <m:oMath xmlns:m="http://schemas.openxmlformats.org/officeDocument/2006/math">
+                      <m:sSub>
+                        <m:sSubPr>
+                          <m:ctrlPr>
+                            <a:rPr lang="pl-PL" b="0" i="1" smtClean="0">
+                              <a:latin typeface="Cambria Math"/>
+                            </a:rPr>
+                          </m:ctrlPr>
+                        </m:sSubPr>
+                        <m:e>
+                          <m:r>
+                            <a:rPr lang="pl-PL" b="0" i="1" smtClean="0">
+                              <a:latin typeface="Cambria Math"/>
+                            </a:rPr>
+                            <m:t>𝑏</m:t>
+                          </m:r>
+                        </m:e>
+                        <m:sub>
+                          <m:r>
+                            <a:rPr lang="pl-PL" b="0" i="1" smtClean="0">
+                              <a:latin typeface="Cambria Math"/>
+                            </a:rPr>
+                            <m:t>𝐿</m:t>
+                          </m:r>
+                        </m:sub>
+                      </m:sSub>
+                    </m:oMath>
+                  </m:oMathPara>
+                </a14:m>
+                <a:endParaRPr lang="pl-PL" dirty="0"/>
+              </a:p>
+            </p:txBody>
+          </p:sp>
+        </mc:Choice>
+        <mc:Fallback>
+          <p:sp>
+            <p:nvSpPr>
+              <p:cNvPr id="19" name="pole tekstowe 72">
+                <a:extLst>
+                  <a:ext uri="{FF2B5EF4-FFF2-40B4-BE49-F238E27FC236}">
+                    <a16:creationId xmlns:a16="http://schemas.microsoft.com/office/drawing/2014/main" xmlns:a14="http://schemas.microsoft.com/office/drawing/2010/main" xmlns="" id="{56E98669-6C23-4727-9DA1-47813C52EC16}"/>
+                  </a:ext>
+                </a:extLst>
+              </p:cNvPr>
+              <p:cNvSpPr txBox="1">
+                <a:spLocks noRot="1" noChangeAspect="1" noMove="1" noResize="1" noEditPoints="1" noAdjustHandles="1" noChangeArrowheads="1" noChangeShapeType="1" noTextEdit="1"/>
+              </p:cNvSpPr>
+              <p:nvPr/>
+            </p:nvSpPr>
+            <p:spPr>
+              <a:xfrm>
+                <a:off x="8742251" y="1736572"/>
+                <a:ext cx="276038" cy="276999"/>
+              </a:xfrm>
+              <a:prstGeom prst="rect">
+                <a:avLst/>
+              </a:prstGeom>
+              <a:blipFill rotWithShape="1">
+                <a:blip r:embed="rId4"/>
+                <a:stretch>
+                  <a:fillRect l="-20000" r="-6667" b="-15556"/>
+                </a:stretch>
+              </a:blipFill>
+            </p:spPr>
+            <p:txBody>
+              <a:bodyPr/>
+              <a:lstStyle/>
+              <a:p>
+                <a:r>
+                  <a:rPr lang="pl-PL">
+                    <a:noFill/>
+                  </a:rPr>
+                  <a:t> </a:t>
+                </a:r>
+              </a:p>
+            </p:txBody>
+          </p:sp>
+        </mc:Fallback>
+      </mc:AlternateContent>
+      <p:sp>
+        <p:nvSpPr>
+          <p:cNvPr id="21" name="TextBox 20"/>
+          <p:cNvSpPr txBox="1"/>
+          <p:nvPr/>
+        </p:nvSpPr>
+        <p:spPr>
+          <a:xfrm>
+            <a:off x="6547738" y="1859684"/>
+            <a:ext cx="1131144" cy="584775"/>
+          </a:xfrm>
+          <a:prstGeom prst="rect">
+            <a:avLst/>
+          </a:prstGeom>
+          <a:noFill/>
+        </p:spPr>
+        <p:txBody>
+          <a:bodyPr wrap="square" rtlCol="0">
+            <a:spAutoFit/>
+          </a:bodyPr>
+          <a:lstStyle/>
+          <a:p>
+            <a:r>
+              <a:rPr lang="pl-PL" sz="3200" dirty="0" smtClean="0"/>
+              <a:t>.   .   .</a:t>
+            </a:r>
+            <a:endParaRPr lang="pl-PL" sz="3200" dirty="0"/>
+          </a:p>
+        </p:txBody>
+      </p:sp>
+      <mc:AlternateContent xmlns:mc="http://schemas.openxmlformats.org/markup-compatibility/2006">
+        <mc:Choice xmlns:a14="http://schemas.microsoft.com/office/drawing/2010/main" Requires="a14">
+          <p:sp>
+            <p:nvSpPr>
+              <p:cNvPr id="22" name="TextBox 21"/>
+              <p:cNvSpPr txBox="1"/>
+              <p:nvPr/>
+            </p:nvSpPr>
+            <p:spPr>
+              <a:xfrm>
+                <a:off x="3072380" y="2761611"/>
+                <a:ext cx="365805" cy="369332"/>
+              </a:xfrm>
+              <a:prstGeom prst="rect">
+                <a:avLst/>
+              </a:prstGeom>
+              <a:noFill/>
+            </p:spPr>
+            <p:txBody>
+              <a:bodyPr wrap="none" rtlCol="0">
+                <a:spAutoFit/>
+              </a:bodyPr>
+              <a:lstStyle/>
+              <a:p>
+                <a14:m>
+                  <m:oMathPara xmlns:m="http://schemas.openxmlformats.org/officeDocument/2006/math">
+                    <m:oMathParaPr>
+                      <m:jc m:val="centerGroup"/>
+                    </m:oMathParaPr>
+                    <m:oMath xmlns:m="http://schemas.openxmlformats.org/officeDocument/2006/math">
+                      <m:r>
+                        <a:rPr lang="pl-PL" b="0" i="1" smtClean="0">
+                          <a:latin typeface="Cambria Math"/>
+                        </a:rPr>
+                        <m:t>0</m:t>
+                      </m:r>
+                    </m:oMath>
+                  </m:oMathPara>
+                </a14:m>
+                <a:endParaRPr lang="pl-PL" dirty="0"/>
+              </a:p>
+            </p:txBody>
+          </p:sp>
+        </mc:Choice>
+        <mc:Fallback>
+          <p:sp>
+            <p:nvSpPr>
+              <p:cNvPr id="22" name="TextBox 21"/>
+              <p:cNvSpPr txBox="1">
+                <a:spLocks noRot="1" noChangeAspect="1" noMove="1" noResize="1" noEditPoints="1" noAdjustHandles="1" noChangeArrowheads="1" noChangeShapeType="1" noTextEdit="1"/>
+              </p:cNvSpPr>
+              <p:nvPr/>
+            </p:nvSpPr>
+            <p:spPr>
+              <a:xfrm>
+                <a:off x="3072380" y="2761611"/>
+                <a:ext cx="365805" cy="369332"/>
+              </a:xfrm>
+              <a:prstGeom prst="rect">
+                <a:avLst/>
+              </a:prstGeom>
+              <a:blipFill rotWithShape="1">
+                <a:blip r:embed="rId5"/>
+                <a:stretch>
+                  <a:fillRect/>
+                </a:stretch>
+              </a:blipFill>
+            </p:spPr>
+            <p:txBody>
+              <a:bodyPr/>
+              <a:lstStyle/>
+              <a:p>
+                <a:r>
+                  <a:rPr lang="pl-PL">
+                    <a:noFill/>
+                  </a:rPr>
+                  <a:t> </a:t>
+                </a:r>
+              </a:p>
+            </p:txBody>
+          </p:sp>
+        </mc:Fallback>
+      </mc:AlternateContent>
+      <mc:AlternateContent xmlns:mc="http://schemas.openxmlformats.org/markup-compatibility/2006">
+        <mc:Choice xmlns:a14="http://schemas.microsoft.com/office/drawing/2010/main" Requires="a14">
+          <p:sp>
+            <p:nvSpPr>
+              <p:cNvPr id="23" name="TextBox 22"/>
+              <p:cNvSpPr txBox="1"/>
+              <p:nvPr/>
+            </p:nvSpPr>
+            <p:spPr>
+              <a:xfrm>
+                <a:off x="4242309" y="2759240"/>
+                <a:ext cx="505844" cy="369332"/>
+              </a:xfrm>
+              <a:prstGeom prst="rect">
+                <a:avLst/>
+              </a:prstGeom>
+              <a:noFill/>
+            </p:spPr>
+            <p:txBody>
+              <a:bodyPr wrap="none" rtlCol="0">
+                <a:spAutoFit/>
+              </a:bodyPr>
+              <a:lstStyle/>
+              <a:p>
+                <a14:m>
+                  <m:oMathPara xmlns:m="http://schemas.openxmlformats.org/officeDocument/2006/math">
+                    <m:oMathParaPr>
+                      <m:jc m:val="centerGroup"/>
+                    </m:oMathParaPr>
+                    <m:oMath xmlns:m="http://schemas.openxmlformats.org/officeDocument/2006/math">
+                      <m:r>
+                        <a:rPr lang="pl-PL" i="1" smtClean="0">
+                          <a:latin typeface="Cambria Math"/>
+                          <a:ea typeface="Cambria Math"/>
+                        </a:rPr>
+                        <m:t>∆</m:t>
+                      </m:r>
+                      <m:r>
+                        <a:rPr lang="pl-PL" b="0" i="1" smtClean="0">
+                          <a:latin typeface="Cambria Math"/>
+                          <a:ea typeface="Cambria Math"/>
+                        </a:rPr>
+                        <m:t>𝑥</m:t>
+                      </m:r>
+                    </m:oMath>
+                  </m:oMathPara>
+                </a14:m>
+                <a:endParaRPr lang="pl-PL" dirty="0"/>
+              </a:p>
+            </p:txBody>
+          </p:sp>
+        </mc:Choice>
+        <mc:Fallback>
+          <p:sp>
+            <p:nvSpPr>
+              <p:cNvPr id="23" name="TextBox 22"/>
+              <p:cNvSpPr txBox="1">
+                <a:spLocks noRot="1" noChangeAspect="1" noMove="1" noResize="1" noEditPoints="1" noAdjustHandles="1" noChangeArrowheads="1" noChangeShapeType="1" noTextEdit="1"/>
+              </p:cNvSpPr>
+              <p:nvPr/>
+            </p:nvSpPr>
+            <p:spPr>
+              <a:xfrm>
+                <a:off x="4242309" y="2759240"/>
+                <a:ext cx="505844" cy="369332"/>
+              </a:xfrm>
+              <a:prstGeom prst="rect">
+                <a:avLst/>
+              </a:prstGeom>
+              <a:blipFill rotWithShape="1">
+                <a:blip r:embed="rId6"/>
+                <a:stretch>
+                  <a:fillRect/>
+                </a:stretch>
+              </a:blipFill>
+            </p:spPr>
+            <p:txBody>
+              <a:bodyPr/>
+              <a:lstStyle/>
+              <a:p>
+                <a:r>
+                  <a:rPr lang="pl-PL">
+                    <a:noFill/>
+                  </a:rPr>
+                  <a:t> </a:t>
+                </a:r>
+              </a:p>
+            </p:txBody>
+          </p:sp>
+        </mc:Fallback>
+      </mc:AlternateContent>
+      <mc:AlternateContent xmlns:mc="http://schemas.openxmlformats.org/markup-compatibility/2006">
+        <mc:Choice xmlns:a14="http://schemas.microsoft.com/office/drawing/2010/main" Requires="a14">
+          <p:sp>
+            <p:nvSpPr>
+              <p:cNvPr id="24" name="TextBox 23"/>
+              <p:cNvSpPr txBox="1"/>
+              <p:nvPr/>
+            </p:nvSpPr>
+            <p:spPr>
+              <a:xfrm>
+                <a:off x="5473475" y="2726974"/>
+                <a:ext cx="634084" cy="369332"/>
+              </a:xfrm>
+              <a:prstGeom prst="rect">
+                <a:avLst/>
+              </a:prstGeom>
+              <a:noFill/>
+            </p:spPr>
+            <p:txBody>
+              <a:bodyPr wrap="none" rtlCol="0">
+                <a:spAutoFit/>
+              </a:bodyPr>
+              <a:lstStyle/>
+              <a:p>
+                <a14:m>
+                  <m:oMathPara xmlns:m="http://schemas.openxmlformats.org/officeDocument/2006/math">
+                    <m:oMathParaPr>
+                      <m:jc m:val="centerGroup"/>
+                    </m:oMathParaPr>
+                    <m:oMath xmlns:m="http://schemas.openxmlformats.org/officeDocument/2006/math">
+                      <m:r>
+                        <a:rPr lang="pl-PL" b="0" i="1" smtClean="0">
+                          <a:latin typeface="Cambria Math"/>
+                          <a:ea typeface="Cambria Math"/>
+                        </a:rPr>
+                        <m:t>2</m:t>
+                      </m:r>
+                      <m:r>
+                        <a:rPr lang="pl-PL" i="1" smtClean="0">
+                          <a:latin typeface="Cambria Math"/>
+                          <a:ea typeface="Cambria Math"/>
+                        </a:rPr>
+                        <m:t>∆</m:t>
+                      </m:r>
+                      <m:r>
+                        <a:rPr lang="pl-PL" b="0" i="1" smtClean="0">
+                          <a:latin typeface="Cambria Math"/>
+                          <a:ea typeface="Cambria Math"/>
+                        </a:rPr>
+                        <m:t>𝑥</m:t>
+                      </m:r>
+                    </m:oMath>
+                  </m:oMathPara>
+                </a14:m>
+                <a:endParaRPr lang="pl-PL" dirty="0"/>
+              </a:p>
+            </p:txBody>
+          </p:sp>
+        </mc:Choice>
+        <mc:Fallback>
+          <p:sp>
+            <p:nvSpPr>
+              <p:cNvPr id="24" name="TextBox 23"/>
+              <p:cNvSpPr txBox="1">
+                <a:spLocks noRot="1" noChangeAspect="1" noMove="1" noResize="1" noEditPoints="1" noAdjustHandles="1" noChangeArrowheads="1" noChangeShapeType="1" noTextEdit="1"/>
+              </p:cNvSpPr>
+              <p:nvPr/>
+            </p:nvSpPr>
+            <p:spPr>
+              <a:xfrm>
+                <a:off x="5473475" y="2726974"/>
+                <a:ext cx="634084" cy="369332"/>
+              </a:xfrm>
+              <a:prstGeom prst="rect">
+                <a:avLst/>
+              </a:prstGeom>
+              <a:blipFill rotWithShape="1">
+                <a:blip r:embed="rId7"/>
+                <a:stretch>
+                  <a:fillRect/>
+                </a:stretch>
+              </a:blipFill>
+            </p:spPr>
+            <p:txBody>
+              <a:bodyPr/>
+              <a:lstStyle/>
+              <a:p>
+                <a:r>
+                  <a:rPr lang="pl-PL">
+                    <a:noFill/>
+                  </a:rPr>
+                  <a:t> </a:t>
+                </a:r>
+              </a:p>
+            </p:txBody>
+          </p:sp>
+        </mc:Fallback>
+      </mc:AlternateContent>
+      <mc:AlternateContent xmlns:mc="http://schemas.openxmlformats.org/markup-compatibility/2006">
+        <mc:Choice xmlns:a14="http://schemas.microsoft.com/office/drawing/2010/main" Requires="a14">
+          <p:sp>
+            <p:nvSpPr>
+              <p:cNvPr id="25" name="TextBox 24"/>
+              <p:cNvSpPr txBox="1"/>
+              <p:nvPr/>
+            </p:nvSpPr>
+            <p:spPr>
+              <a:xfrm>
+                <a:off x="7978595" y="2763796"/>
+                <a:ext cx="634020" cy="369332"/>
+              </a:xfrm>
+              <a:prstGeom prst="rect">
+                <a:avLst/>
+              </a:prstGeom>
+              <a:noFill/>
+            </p:spPr>
+            <p:txBody>
+              <a:bodyPr wrap="none" rtlCol="0">
+                <a:spAutoFit/>
+              </a:bodyPr>
+              <a:lstStyle/>
+              <a:p>
+                <a14:m>
+                  <m:oMathPara xmlns:m="http://schemas.openxmlformats.org/officeDocument/2006/math">
+                    <m:oMathParaPr>
+                      <m:jc m:val="centerGroup"/>
+                    </m:oMathParaPr>
+                    <m:oMath xmlns:m="http://schemas.openxmlformats.org/officeDocument/2006/math">
+                      <m:r>
+                        <a:rPr lang="pl-PL" b="0" i="1" smtClean="0">
+                          <a:latin typeface="Cambria Math"/>
+                          <a:ea typeface="Cambria Math"/>
+                        </a:rPr>
+                        <m:t>𝐿</m:t>
+                      </m:r>
+                      <m:r>
+                        <a:rPr lang="pl-PL" i="1" smtClean="0">
+                          <a:latin typeface="Cambria Math"/>
+                          <a:ea typeface="Cambria Math"/>
+                        </a:rPr>
+                        <m:t>∆</m:t>
+                      </m:r>
+                      <m:r>
+                        <a:rPr lang="pl-PL" b="0" i="1" smtClean="0">
+                          <a:latin typeface="Cambria Math"/>
+                          <a:ea typeface="Cambria Math"/>
+                        </a:rPr>
+                        <m:t>𝑥</m:t>
+                      </m:r>
+                    </m:oMath>
+                  </m:oMathPara>
+                </a14:m>
+                <a:endParaRPr lang="pl-PL" dirty="0"/>
+              </a:p>
+            </p:txBody>
+          </p:sp>
+        </mc:Choice>
+        <mc:Fallback>
+          <p:sp>
+            <p:nvSpPr>
+              <p:cNvPr id="25" name="TextBox 24"/>
+              <p:cNvSpPr txBox="1">
+                <a:spLocks noRot="1" noChangeAspect="1" noMove="1" noResize="1" noEditPoints="1" noAdjustHandles="1" noChangeArrowheads="1" noChangeShapeType="1" noTextEdit="1"/>
+              </p:cNvSpPr>
+              <p:nvPr/>
+            </p:nvSpPr>
+            <p:spPr>
+              <a:xfrm>
+                <a:off x="7978595" y="2763796"/>
+                <a:ext cx="634020" cy="369332"/>
+              </a:xfrm>
+              <a:prstGeom prst="rect">
+                <a:avLst/>
+              </a:prstGeom>
+              <a:blipFill rotWithShape="1">
+                <a:blip r:embed="rId8"/>
+                <a:stretch>
+                  <a:fillRect/>
+                </a:stretch>
+              </a:blipFill>
+            </p:spPr>
+            <p:txBody>
+              <a:bodyPr/>
+              <a:lstStyle/>
+              <a:p>
+                <a:r>
+                  <a:rPr lang="pl-PL">
+                    <a:noFill/>
+                  </a:rPr>
+                  <a:t> </a:t>
+                </a:r>
+              </a:p>
+            </p:txBody>
+          </p:sp>
+        </mc:Fallback>
+      </mc:AlternateContent>
+      <mc:AlternateContent xmlns:mc="http://schemas.openxmlformats.org/markup-compatibility/2006">
+        <mc:Choice xmlns:a14="http://schemas.microsoft.com/office/drawing/2010/main" Requires="a14">
+          <p:sp>
+            <p:nvSpPr>
+              <p:cNvPr id="26" name="TextBox 25"/>
+              <p:cNvSpPr txBox="1"/>
+              <p:nvPr/>
+            </p:nvSpPr>
+            <p:spPr>
+              <a:xfrm>
+                <a:off x="9107544" y="2703381"/>
+                <a:ext cx="1230337" cy="369332"/>
+              </a:xfrm>
+              <a:prstGeom prst="rect">
+                <a:avLst/>
+              </a:prstGeom>
+              <a:noFill/>
+            </p:spPr>
+            <p:txBody>
+              <a:bodyPr wrap="none" rtlCol="0">
+                <a:spAutoFit/>
+              </a:bodyPr>
+              <a:lstStyle/>
+              <a:p>
+                <a14:m>
+                  <m:oMathPara xmlns:m="http://schemas.openxmlformats.org/officeDocument/2006/math">
+                    <m:oMathParaPr>
+                      <m:jc m:val="centerGroup"/>
+                    </m:oMathParaPr>
+                    <m:oMath xmlns:m="http://schemas.openxmlformats.org/officeDocument/2006/math">
+                      <m:r>
+                        <a:rPr lang="pl-PL" b="0" i="1" smtClean="0">
+                          <a:latin typeface="Cambria Math"/>
+                          <a:ea typeface="Cambria Math"/>
+                        </a:rPr>
+                        <m:t>(</m:t>
+                      </m:r>
+                      <m:r>
+                        <a:rPr lang="pl-PL" b="0" i="1" smtClean="0">
+                          <a:latin typeface="Cambria Math"/>
+                          <a:ea typeface="Cambria Math"/>
+                        </a:rPr>
+                        <m:t>𝐿</m:t>
+                      </m:r>
+                      <m:r>
+                        <a:rPr lang="pl-PL" b="0" i="1" smtClean="0">
+                          <a:latin typeface="Cambria Math"/>
+                          <a:ea typeface="Cambria Math"/>
+                        </a:rPr>
+                        <m:t>+1)∆</m:t>
+                      </m:r>
+                      <m:r>
+                        <a:rPr lang="pl-PL" b="0" i="1" smtClean="0">
+                          <a:latin typeface="Cambria Math"/>
+                          <a:ea typeface="Cambria Math"/>
+                        </a:rPr>
+                        <m:t>𝑥</m:t>
+                      </m:r>
+                    </m:oMath>
+                  </m:oMathPara>
+                </a14:m>
+                <a:endParaRPr lang="pl-PL" dirty="0"/>
+              </a:p>
+            </p:txBody>
+          </p:sp>
+        </mc:Choice>
+        <mc:Fallback>
+          <p:sp>
+            <p:nvSpPr>
+              <p:cNvPr id="26" name="TextBox 25"/>
+              <p:cNvSpPr txBox="1">
+                <a:spLocks noRot="1" noChangeAspect="1" noMove="1" noResize="1" noEditPoints="1" noAdjustHandles="1" noChangeArrowheads="1" noChangeShapeType="1" noTextEdit="1"/>
+              </p:cNvSpPr>
+              <p:nvPr/>
+            </p:nvSpPr>
+            <p:spPr>
+              <a:xfrm>
+                <a:off x="9107544" y="2703381"/>
+                <a:ext cx="1230337" cy="369332"/>
+              </a:xfrm>
+              <a:prstGeom prst="rect">
+                <a:avLst/>
+              </a:prstGeom>
+              <a:blipFill rotWithShape="1">
+                <a:blip r:embed="rId9"/>
+                <a:stretch>
+                  <a:fillRect b="-11475"/>
+                </a:stretch>
+              </a:blipFill>
+            </p:spPr>
+            <p:txBody>
+              <a:bodyPr/>
+              <a:lstStyle/>
+              <a:p>
+                <a:r>
+                  <a:rPr lang="pl-PL">
+                    <a:noFill/>
+                  </a:rPr>
+                  <a:t> </a:t>
+                </a:r>
+              </a:p>
+            </p:txBody>
+          </p:sp>
+        </mc:Fallback>
+      </mc:AlternateContent>
+      <p:sp>
+        <p:nvSpPr>
+          <p:cNvPr id="27" name="Right Brace 26"/>
+          <p:cNvSpPr/>
+          <p:nvPr/>
+        </p:nvSpPr>
+        <p:spPr>
+          <a:xfrm rot="16200000">
+            <a:off x="3673441" y="1718527"/>
+            <a:ext cx="403637" cy="1239950"/>
+          </a:xfrm>
+          <a:prstGeom prst="rightBrace">
+            <a:avLst>
+              <a:gd name="adj1" fmla="val 8333"/>
+              <a:gd name="adj2" fmla="val 50668"/>
+            </a:avLst>
+          </a:prstGeom>
+          <a:ln w="19050"/>
+        </p:spPr>
+        <p:style>
+          <a:lnRef idx="1">
+            <a:schemeClr val="accent2"/>
+          </a:lnRef>
+          <a:fillRef idx="0">
+            <a:schemeClr val="accent2"/>
+          </a:fillRef>
+          <a:effectRef idx="0">
+            <a:schemeClr val="accent2"/>
+          </a:effectRef>
+          <a:fontRef idx="minor">
+            <a:schemeClr val="tx1"/>
+          </a:fontRef>
+        </p:style>
+        <p:txBody>
+          <a:bodyPr rtlCol="0" anchor="ctr"/>
+          <a:lstStyle/>
+          <a:p>
+            <a:pPr algn="ctr"/>
+            <a:endParaRPr lang="pl-PL">
+              <a:solidFill>
+                <a:srgbClr val="FF0000"/>
+              </a:solidFill>
+            </a:endParaRPr>
+          </a:p>
+        </p:txBody>
+      </p:sp>
+      <p:sp>
+        <p:nvSpPr>
+          <p:cNvPr id="28" name="Right Brace 27"/>
+          <p:cNvSpPr/>
+          <p:nvPr/>
+        </p:nvSpPr>
+        <p:spPr>
+          <a:xfrm rot="16200000">
+            <a:off x="4953765" y="1703567"/>
+            <a:ext cx="403637" cy="1269870"/>
+          </a:xfrm>
+          <a:prstGeom prst="rightBrace">
+            <a:avLst>
+              <a:gd name="adj1" fmla="val 8333"/>
+              <a:gd name="adj2" fmla="val 50668"/>
+            </a:avLst>
+          </a:prstGeom>
+          <a:ln w="19050"/>
+        </p:spPr>
+        <p:style>
+          <a:lnRef idx="1">
+            <a:schemeClr val="accent2"/>
+          </a:lnRef>
+          <a:fillRef idx="0">
+            <a:schemeClr val="accent2"/>
+          </a:fillRef>
+          <a:effectRef idx="0">
+            <a:schemeClr val="accent2"/>
+          </a:effectRef>
+          <a:fontRef idx="minor">
+            <a:schemeClr val="tx1"/>
+          </a:fontRef>
+        </p:style>
+        <p:txBody>
+          <a:bodyPr rtlCol="0" anchor="ctr"/>
+          <a:lstStyle/>
+          <a:p>
+            <a:pPr algn="ctr"/>
+            <a:endParaRPr lang="pl-PL">
+              <a:solidFill>
+                <a:srgbClr val="FF0000"/>
+              </a:solidFill>
+            </a:endParaRPr>
+          </a:p>
+        </p:txBody>
+      </p:sp>
+      <p:sp>
+        <p:nvSpPr>
+          <p:cNvPr id="29" name="Right Brace 28"/>
+          <p:cNvSpPr/>
+          <p:nvPr/>
+        </p:nvSpPr>
+        <p:spPr>
+          <a:xfrm rot="16200000">
+            <a:off x="8699784" y="1688546"/>
+            <a:ext cx="403637" cy="1295287"/>
+          </a:xfrm>
+          <a:prstGeom prst="rightBrace">
+            <a:avLst>
+              <a:gd name="adj1" fmla="val 8333"/>
+              <a:gd name="adj2" fmla="val 50668"/>
+            </a:avLst>
+          </a:prstGeom>
+          <a:ln w="19050"/>
+        </p:spPr>
+        <p:style>
+          <a:lnRef idx="1">
+            <a:schemeClr val="accent2"/>
+          </a:lnRef>
+          <a:fillRef idx="0">
+            <a:schemeClr val="accent2"/>
+          </a:fillRef>
+          <a:effectRef idx="0">
+            <a:schemeClr val="accent2"/>
+          </a:effectRef>
+          <a:fontRef idx="minor">
+            <a:schemeClr val="tx1"/>
+          </a:fontRef>
+        </p:style>
+        <p:txBody>
+          <a:bodyPr rtlCol="0" anchor="ctr"/>
+          <a:lstStyle/>
+          <a:p>
+            <a:pPr algn="ctr"/>
+            <a:endParaRPr lang="pl-PL">
+              <a:solidFill>
+                <a:srgbClr val="FF0000"/>
+              </a:solidFill>
+            </a:endParaRPr>
+          </a:p>
+        </p:txBody>
+      </p:sp>
+    </p:spTree>
+    <p:extLst>
+      <p:ext uri="{BB962C8B-B14F-4D97-AF65-F5344CB8AC3E}">
+        <p14:creationId xmlns:p14="http://schemas.microsoft.com/office/powerpoint/2010/main" val="1410294644"/>
       </p:ext>
     </p:extLst>
   </p:cSld>
@@ -6131,7 +7423,7 @@
     </a:clrScheme>
     <a:fontScheme name="Pakiet Office">
       <a:majorFont>
-        <a:latin typeface="Calibri Light" panose="020F0302020204030204"/>
+        <a:latin typeface="Calibri Light"/>
         <a:ea typeface=""/>
         <a:cs typeface=""/>
         <a:font script="Jpan" typeface="游ゴシック Light"/>
@@ -6183,7 +7475,7 @@
         <a:font script="Tfng" typeface="Ebrima"/>
       </a:majorFont>
       <a:minorFont>
-        <a:latin typeface="Calibri" panose="020F0502020204030204"/>
+        <a:latin typeface="Calibri"/>
         <a:ea typeface=""/>
         <a:cs typeface=""/>
         <a:font script="Jpan" typeface="游ゴシック"/>
@@ -6377,7 +7669,7 @@
   <a:extraClrSchemeLst/>
   <a:extLst>
     <a:ext uri="{05A4C25C-085E-4340-85A3-A5531E510DB2}">
-      <thm15:themeFamily xmlns:thm15="http://schemas.microsoft.com/office/thememl/2012/main" name="Office Theme" id="{62F939B6-93AF-4DB8-9C6B-D6C7DFDC589F}" vid="{4A3C46E8-61CC-4603-A589-7422A47A8E4A}"/>
+      <thm15:themeFamily xmlns:thm15="http://schemas.microsoft.com/office/thememl/2012/main" xmlns="" name="Office Theme" id="{62F939B6-93AF-4DB8-9C6B-D6C7DFDC589F}" vid="{4A3C46E8-61CC-4603-A589-7422A47A8E4A}"/>
     </a:ext>
   </a:extLst>
 </a:theme>

</xml_diff>